<commit_message>
[Java] - Thread, Time, Date, Calender, Annotation, IO, Collection
</commit_message>
<xml_diff>
--- a/학습자료/학습 정리.pptx
+++ b/학습자료/학습 정리.pptx
@@ -27,6 +27,9 @@
     <p:sldId id="275" r:id="rId21"/>
     <p:sldId id="276" r:id="rId22"/>
     <p:sldId id="277" r:id="rId23"/>
+    <p:sldId id="278" r:id="rId24"/>
+    <p:sldId id="279" r:id="rId25"/>
+    <p:sldId id="280" r:id="rId26"/>
   </p:sldIdLst>
   <p:sldSz cx="12192000" cy="6858000"/>
   <p:notesSz cx="6858000" cy="9144000"/>
@@ -280,7 +283,7 @@
           <a:p>
             <a:fld id="{0C572C61-C509-4714-B304-DEF8ECAB5EC0}" type="datetimeFigureOut">
               <a:rPr lang="ko-KR" altLang="en-US" smtClean="0"/>
-              <a:t>2020-12-13</a:t>
+              <a:t>2020-12-18</a:t>
             </a:fld>
             <a:endParaRPr lang="ko-KR" altLang="en-US"/>
           </a:p>
@@ -478,7 +481,7 @@
           <a:p>
             <a:fld id="{0C572C61-C509-4714-B304-DEF8ECAB5EC0}" type="datetimeFigureOut">
               <a:rPr lang="ko-KR" altLang="en-US" smtClean="0"/>
-              <a:t>2020-12-13</a:t>
+              <a:t>2020-12-18</a:t>
             </a:fld>
             <a:endParaRPr lang="ko-KR" altLang="en-US"/>
           </a:p>
@@ -686,7 +689,7 @@
           <a:p>
             <a:fld id="{0C572C61-C509-4714-B304-DEF8ECAB5EC0}" type="datetimeFigureOut">
               <a:rPr lang="ko-KR" altLang="en-US" smtClean="0"/>
-              <a:t>2020-12-13</a:t>
+              <a:t>2020-12-18</a:t>
             </a:fld>
             <a:endParaRPr lang="ko-KR" altLang="en-US"/>
           </a:p>
@@ -884,7 +887,7 @@
           <a:p>
             <a:fld id="{0C572C61-C509-4714-B304-DEF8ECAB5EC0}" type="datetimeFigureOut">
               <a:rPr lang="ko-KR" altLang="en-US" smtClean="0"/>
-              <a:t>2020-12-13</a:t>
+              <a:t>2020-12-18</a:t>
             </a:fld>
             <a:endParaRPr lang="ko-KR" altLang="en-US"/>
           </a:p>
@@ -1159,7 +1162,7 @@
           <a:p>
             <a:fld id="{0C572C61-C509-4714-B304-DEF8ECAB5EC0}" type="datetimeFigureOut">
               <a:rPr lang="ko-KR" altLang="en-US" smtClean="0"/>
-              <a:t>2020-12-13</a:t>
+              <a:t>2020-12-18</a:t>
             </a:fld>
             <a:endParaRPr lang="ko-KR" altLang="en-US"/>
           </a:p>
@@ -1424,7 +1427,7 @@
           <a:p>
             <a:fld id="{0C572C61-C509-4714-B304-DEF8ECAB5EC0}" type="datetimeFigureOut">
               <a:rPr lang="ko-KR" altLang="en-US" smtClean="0"/>
-              <a:t>2020-12-13</a:t>
+              <a:t>2020-12-18</a:t>
             </a:fld>
             <a:endParaRPr lang="ko-KR" altLang="en-US"/>
           </a:p>
@@ -1836,7 +1839,7 @@
           <a:p>
             <a:fld id="{0C572C61-C509-4714-B304-DEF8ECAB5EC0}" type="datetimeFigureOut">
               <a:rPr lang="ko-KR" altLang="en-US" smtClean="0"/>
-              <a:t>2020-12-13</a:t>
+              <a:t>2020-12-18</a:t>
             </a:fld>
             <a:endParaRPr lang="ko-KR" altLang="en-US"/>
           </a:p>
@@ -1977,7 +1980,7 @@
           <a:p>
             <a:fld id="{0C572C61-C509-4714-B304-DEF8ECAB5EC0}" type="datetimeFigureOut">
               <a:rPr lang="ko-KR" altLang="en-US" smtClean="0"/>
-              <a:t>2020-12-13</a:t>
+              <a:t>2020-12-18</a:t>
             </a:fld>
             <a:endParaRPr lang="ko-KR" altLang="en-US"/>
           </a:p>
@@ -2090,7 +2093,7 @@
           <a:p>
             <a:fld id="{0C572C61-C509-4714-B304-DEF8ECAB5EC0}" type="datetimeFigureOut">
               <a:rPr lang="ko-KR" altLang="en-US" smtClean="0"/>
-              <a:t>2020-12-13</a:t>
+              <a:t>2020-12-18</a:t>
             </a:fld>
             <a:endParaRPr lang="ko-KR" altLang="en-US"/>
           </a:p>
@@ -2401,7 +2404,7 @@
           <a:p>
             <a:fld id="{0C572C61-C509-4714-B304-DEF8ECAB5EC0}" type="datetimeFigureOut">
               <a:rPr lang="ko-KR" altLang="en-US" smtClean="0"/>
-              <a:t>2020-12-13</a:t>
+              <a:t>2020-12-18</a:t>
             </a:fld>
             <a:endParaRPr lang="ko-KR" altLang="en-US"/>
           </a:p>
@@ -2689,7 +2692,7 @@
           <a:p>
             <a:fld id="{0C572C61-C509-4714-B304-DEF8ECAB5EC0}" type="datetimeFigureOut">
               <a:rPr lang="ko-KR" altLang="en-US" smtClean="0"/>
-              <a:t>2020-12-13</a:t>
+              <a:t>2020-12-18</a:t>
             </a:fld>
             <a:endParaRPr lang="ko-KR" altLang="en-US"/>
           </a:p>
@@ -2930,7 +2933,7 @@
           <a:p>
             <a:fld id="{0C572C61-C509-4714-B304-DEF8ECAB5EC0}" type="datetimeFigureOut">
               <a:rPr lang="ko-KR" altLang="en-US" smtClean="0"/>
-              <a:t>2020-12-13</a:t>
+              <a:t>2020-12-18</a:t>
             </a:fld>
             <a:endParaRPr lang="ko-KR" altLang="en-US"/>
           </a:p>
@@ -14310,7 +14313,7 @@
         </p:blipFill>
         <p:spPr>
           <a:xfrm>
-            <a:off x="2084839" y="5733277"/>
+            <a:off x="2261302" y="5637024"/>
             <a:ext cx="6988823" cy="4347952"/>
           </a:xfrm>
           <a:prstGeom prst="rect">
@@ -14369,7 +14372,19 @@
           <a:bodyPr/>
           <a:lstStyle/>
           <a:p>
-            <a:endParaRPr lang="ko-KR" altLang="en-US"/>
+            <a:r>
+              <a:rPr lang="en-US" altLang="ko-KR" dirty="0"/>
+              <a:t>List,</a:t>
+            </a:r>
+            <a:r>
+              <a:rPr lang="ko-KR" altLang="en-US" dirty="0"/>
+              <a:t> </a:t>
+            </a:r>
+            <a:r>
+              <a:rPr lang="en-US" altLang="ko-KR" dirty="0"/>
+              <a:t>Set, Map</a:t>
+            </a:r>
+            <a:endParaRPr lang="ko-KR" altLang="en-US" dirty="0"/>
           </a:p>
         </p:txBody>
       </p:sp>
@@ -14391,10 +14406,165 @@
         </p:nvSpPr>
         <p:spPr/>
         <p:txBody>
-          <a:bodyPr/>
+          <a:bodyPr>
+            <a:normAutofit fontScale="92500" lnSpcReduction="20000"/>
+          </a:bodyPr>
           <a:lstStyle/>
           <a:p>
-            <a:endParaRPr lang="ko-KR" altLang="en-US"/>
+            <a:r>
+              <a:rPr lang="en-US" altLang="ko-KR" dirty="0"/>
+              <a:t>List // </a:t>
+            </a:r>
+            <a:r>
+              <a:rPr lang="ko-KR" altLang="en-US" dirty="0"/>
+              <a:t>길이가 변경되는 배열</a:t>
+            </a:r>
+            <a:endParaRPr lang="en-US" altLang="ko-KR" dirty="0"/>
+          </a:p>
+          <a:p>
+            <a:r>
+              <a:rPr lang="en-US" altLang="ko-KR" dirty="0"/>
+              <a:t>- add, iterator, size</a:t>
+            </a:r>
+            <a:r>
+              <a:rPr lang="ko-KR" altLang="en-US" dirty="0"/>
+              <a:t> 사용가능</a:t>
+            </a:r>
+            <a:endParaRPr lang="en-US" altLang="ko-KR" dirty="0"/>
+          </a:p>
+          <a:p>
+            <a:r>
+              <a:rPr lang="en-US" altLang="ko-KR" dirty="0"/>
+              <a:t>- </a:t>
+            </a:r>
+            <a:r>
+              <a:rPr lang="ko-KR" altLang="en-US" dirty="0"/>
+              <a:t>중복자료 허용</a:t>
+            </a:r>
+            <a:endParaRPr lang="en-US" altLang="ko-KR" dirty="0"/>
+          </a:p>
+          <a:p>
+            <a:r>
+              <a:rPr lang="en-US" altLang="ko-KR" dirty="0"/>
+              <a:t>Set // </a:t>
+            </a:r>
+            <a:r>
+              <a:rPr lang="ko-KR" altLang="en-US" dirty="0"/>
+              <a:t>집합의 개념</a:t>
+            </a:r>
+            <a:endParaRPr lang="en-US" altLang="ko-KR" dirty="0"/>
+          </a:p>
+          <a:p>
+            <a:r>
+              <a:rPr lang="en-US" altLang="ko-KR" dirty="0"/>
+              <a:t>- </a:t>
+            </a:r>
+            <a:r>
+              <a:rPr lang="ko-KR" altLang="en-US" dirty="0"/>
+              <a:t>중복자료 </a:t>
+            </a:r>
+            <a:r>
+              <a:rPr lang="ko-KR" altLang="en-US" dirty="0" err="1"/>
+              <a:t>허용안함</a:t>
+            </a:r>
+            <a:endParaRPr lang="en-US" altLang="ko-KR" dirty="0"/>
+          </a:p>
+          <a:p>
+            <a:r>
+              <a:rPr lang="en-US" altLang="ko-KR" dirty="0"/>
+              <a:t>Map</a:t>
+            </a:r>
+          </a:p>
+          <a:p>
+            <a:r>
+              <a:rPr lang="en-US" altLang="ko-KR" dirty="0"/>
+              <a:t>- </a:t>
+            </a:r>
+            <a:r>
+              <a:rPr lang="ko-KR" altLang="en-US" dirty="0"/>
+              <a:t>키</a:t>
+            </a:r>
+            <a:r>
+              <a:rPr lang="en-US" altLang="ko-KR" dirty="0"/>
+              <a:t>, </a:t>
+            </a:r>
+            <a:r>
+              <a:rPr lang="ko-KR" altLang="en-US" dirty="0"/>
+              <a:t>값 쌍으로 구성</a:t>
+            </a:r>
+            <a:endParaRPr lang="en-US" altLang="ko-KR" dirty="0"/>
+          </a:p>
+          <a:p>
+            <a:r>
+              <a:rPr lang="en-US" altLang="ko-KR" dirty="0"/>
+              <a:t>- </a:t>
+            </a:r>
+            <a:r>
+              <a:rPr lang="ko-KR" altLang="en-US" dirty="0"/>
+              <a:t>키는 중복 허용 안되지만 값은 중복이 허용</a:t>
+            </a:r>
+            <a:endParaRPr lang="en-US" altLang="ko-KR" dirty="0"/>
+          </a:p>
+          <a:p>
+            <a:r>
+              <a:rPr lang="en-US" altLang="ko-KR" dirty="0"/>
+              <a:t>- </a:t>
+            </a:r>
+            <a:r>
+              <a:rPr lang="ko-KR" altLang="en-US" dirty="0"/>
+              <a:t>데이터를 </a:t>
+            </a:r>
+            <a:r>
+              <a:rPr lang="ko-KR" altLang="en-US" dirty="0" err="1"/>
+              <a:t>넣을때</a:t>
+            </a:r>
+            <a:r>
+              <a:rPr lang="ko-KR" altLang="en-US" dirty="0"/>
+              <a:t> </a:t>
+            </a:r>
+            <a:r>
+              <a:rPr lang="en-US" altLang="ko-KR" dirty="0"/>
+              <a:t>put </a:t>
+            </a:r>
+            <a:r>
+              <a:rPr lang="ko-KR" altLang="en-US" dirty="0"/>
+              <a:t>사용</a:t>
+            </a:r>
+            <a:endParaRPr lang="en-US" altLang="ko-KR" dirty="0"/>
+          </a:p>
+          <a:p>
+            <a:r>
+              <a:rPr lang="en-US" altLang="ko-KR" dirty="0"/>
+              <a:t>- </a:t>
+            </a:r>
+            <a:r>
+              <a:rPr lang="en-US" altLang="ko-KR" dirty="0" err="1"/>
+              <a:t>KeySet</a:t>
+            </a:r>
+            <a:r>
+              <a:rPr lang="ko-KR" altLang="en-US" dirty="0"/>
+              <a:t>을 통해 </a:t>
+            </a:r>
+            <a:r>
+              <a:rPr lang="ko-KR" altLang="en-US" dirty="0" err="1"/>
+              <a:t>키값을</a:t>
+            </a:r>
+            <a:r>
+              <a:rPr lang="ko-KR" altLang="en-US" dirty="0"/>
+              <a:t> 모두 </a:t>
+            </a:r>
+            <a:r>
+              <a:rPr lang="en-US" altLang="ko-KR" dirty="0"/>
+              <a:t>Set </a:t>
+            </a:r>
+            <a:r>
+              <a:rPr lang="ko-KR" altLang="en-US" dirty="0"/>
+              <a:t>자료형으로 꺼낼 수 있음</a:t>
+            </a:r>
+            <a:r>
+              <a:rPr lang="en-US" altLang="ko-KR" dirty="0"/>
+              <a:t>.</a:t>
+            </a:r>
           </a:p>
         </p:txBody>
       </p:sp>
@@ -14402,6 +14572,3009 @@
     <p:extLst>
       <p:ext uri="{BB962C8B-B14F-4D97-AF65-F5344CB8AC3E}">
         <p14:creationId xmlns:p14="http://schemas.microsoft.com/office/powerpoint/2010/main" val="413102261"/>
+      </p:ext>
+    </p:extLst>
+  </p:cSld>
+  <p:clrMapOvr>
+    <a:masterClrMapping/>
+  </p:clrMapOvr>
+</p:sld>
+</file>
+
+<file path=ppt/slides/slide23.xml><?xml version="1.0" encoding="utf-8"?>
+<p:sld xmlns:a="http://schemas.openxmlformats.org/drawingml/2006/main" xmlns:r="http://schemas.openxmlformats.org/officeDocument/2006/relationships" xmlns:p="http://schemas.openxmlformats.org/presentationml/2006/main">
+  <p:cSld>
+    <p:spTree>
+      <p:nvGrpSpPr>
+        <p:cNvPr id="1" name=""/>
+        <p:cNvGrpSpPr/>
+        <p:nvPr/>
+      </p:nvGrpSpPr>
+      <p:grpSpPr>
+        <a:xfrm>
+          <a:off x="0" y="0"/>
+          <a:ext cx="0" cy="0"/>
+          <a:chOff x="0" y="0"/>
+          <a:chExt cx="0" cy="0"/>
+        </a:xfrm>
+      </p:grpSpPr>
+      <p:sp>
+        <p:nvSpPr>
+          <p:cNvPr id="2" name="제목 1">
+            <a:extLst>
+              <a:ext uri="{FF2B5EF4-FFF2-40B4-BE49-F238E27FC236}">
+                <a16:creationId xmlns:a16="http://schemas.microsoft.com/office/drawing/2014/main" id="{FC251B8B-8E1E-44B0-B08D-8B033A70810B}"/>
+              </a:ext>
+            </a:extLst>
+          </p:cNvPr>
+          <p:cNvSpPr>
+            <a:spLocks noGrp="1"/>
+          </p:cNvSpPr>
+          <p:nvPr>
+            <p:ph type="title"/>
+          </p:nvPr>
+        </p:nvSpPr>
+        <p:spPr/>
+        <p:txBody>
+          <a:bodyPr/>
+          <a:lstStyle/>
+          <a:p>
+            <a:r>
+              <a:rPr lang="en-US" altLang="ko-KR" dirty="0"/>
+              <a:t>Date, </a:t>
+            </a:r>
+            <a:r>
+              <a:rPr lang="en-US" altLang="ko-KR" dirty="0" err="1"/>
+              <a:t>Calender</a:t>
+            </a:r>
+            <a:r>
+              <a:rPr lang="en-US" altLang="ko-KR" dirty="0"/>
+              <a:t>, Time</a:t>
+            </a:r>
+            <a:endParaRPr lang="ko-KR" altLang="en-US" dirty="0"/>
+          </a:p>
+        </p:txBody>
+      </p:sp>
+      <p:sp>
+        <p:nvSpPr>
+          <p:cNvPr id="3" name="내용 개체 틀 2">
+            <a:extLst>
+              <a:ext uri="{FF2B5EF4-FFF2-40B4-BE49-F238E27FC236}">
+                <a16:creationId xmlns:a16="http://schemas.microsoft.com/office/drawing/2014/main" id="{BA74F4B8-1C29-47EC-8F16-D29552382CB8}"/>
+              </a:ext>
+            </a:extLst>
+          </p:cNvPr>
+          <p:cNvSpPr>
+            <a:spLocks noGrp="1"/>
+          </p:cNvSpPr>
+          <p:nvPr>
+            <p:ph idx="1"/>
+          </p:nvPr>
+        </p:nvSpPr>
+        <p:spPr/>
+        <p:txBody>
+          <a:bodyPr/>
+          <a:lstStyle/>
+          <a:p>
+            <a:r>
+              <a:rPr lang="en-US" altLang="ko-KR" dirty="0"/>
+              <a:t>Date</a:t>
+            </a:r>
+          </a:p>
+          <a:p>
+            <a:r>
+              <a:rPr lang="en-US" altLang="ko-KR" dirty="0"/>
+              <a:t>- </a:t>
+            </a:r>
+            <a:r>
+              <a:rPr lang="ko-KR" altLang="en-US" dirty="0"/>
+              <a:t>자바 </a:t>
+            </a:r>
+            <a:r>
+              <a:rPr lang="en-US" altLang="ko-KR" dirty="0"/>
+              <a:t>1.0 </a:t>
+            </a:r>
+            <a:r>
+              <a:rPr lang="ko-KR" altLang="en-US" dirty="0"/>
+              <a:t>부터</a:t>
+            </a:r>
+            <a:r>
+              <a:rPr lang="en-US" altLang="ko-KR" dirty="0"/>
+              <a:t> </a:t>
+            </a:r>
+            <a:r>
+              <a:rPr lang="ko-KR" altLang="en-US" dirty="0"/>
+              <a:t>있었음 </a:t>
+            </a:r>
+            <a:r>
+              <a:rPr lang="en-US" altLang="ko-KR" dirty="0"/>
+              <a:t>//</a:t>
+            </a:r>
+            <a:r>
+              <a:rPr lang="ko-KR" altLang="en-US" dirty="0"/>
+              <a:t> 지역시간 고려안하고 설계</a:t>
+            </a:r>
+            <a:endParaRPr lang="en-US" altLang="ko-KR" dirty="0"/>
+          </a:p>
+          <a:p>
+            <a:r>
+              <a:rPr lang="en-US" altLang="ko-KR" dirty="0" err="1"/>
+              <a:t>Calender</a:t>
+            </a:r>
+            <a:endParaRPr lang="en-US" altLang="ko-KR" dirty="0"/>
+          </a:p>
+          <a:p>
+            <a:r>
+              <a:rPr lang="en-US" altLang="ko-KR" dirty="0"/>
+              <a:t>- </a:t>
+            </a:r>
+            <a:r>
+              <a:rPr lang="ko-KR" altLang="en-US" dirty="0"/>
+              <a:t>자바 </a:t>
+            </a:r>
+            <a:r>
+              <a:rPr lang="en-US" altLang="ko-KR" dirty="0"/>
+              <a:t>1.1 </a:t>
+            </a:r>
+            <a:r>
+              <a:rPr lang="ko-KR" altLang="en-US" dirty="0"/>
+              <a:t>지역시간 고려하고 설계</a:t>
+            </a:r>
+            <a:endParaRPr lang="en-US" altLang="ko-KR" dirty="0"/>
+          </a:p>
+          <a:p>
+            <a:r>
+              <a:rPr lang="en-US" altLang="ko-KR" dirty="0"/>
+              <a:t>- </a:t>
+            </a:r>
+            <a:r>
+              <a:rPr lang="en-US" altLang="ko-KR" dirty="0" err="1"/>
+              <a:t>Calender</a:t>
+            </a:r>
+            <a:r>
+              <a:rPr lang="ko-KR" altLang="en-US" dirty="0"/>
+              <a:t>에서 월은 현재 월에서 </a:t>
+            </a:r>
+            <a:r>
+              <a:rPr lang="en-US" altLang="ko-KR" dirty="0"/>
+              <a:t>– 1 </a:t>
+            </a:r>
+            <a:r>
+              <a:rPr lang="ko-KR" altLang="en-US" dirty="0"/>
+              <a:t>된 상태로 표시한다</a:t>
+            </a:r>
+            <a:r>
+              <a:rPr lang="en-US" altLang="ko-KR" dirty="0"/>
+              <a:t>.</a:t>
+            </a:r>
+          </a:p>
+          <a:p>
+            <a:r>
+              <a:rPr lang="en-US" altLang="ko-KR" dirty="0"/>
+              <a:t>Time</a:t>
+            </a:r>
+          </a:p>
+          <a:p>
+            <a:r>
+              <a:rPr lang="en-US" altLang="ko-KR" dirty="0"/>
+              <a:t>- </a:t>
+            </a:r>
+            <a:r>
+              <a:rPr lang="ko-KR" altLang="en-US" dirty="0"/>
+              <a:t>자바 </a:t>
+            </a:r>
+            <a:r>
+              <a:rPr lang="en-US" altLang="ko-KR" dirty="0"/>
+              <a:t>SE 8 </a:t>
+            </a:r>
+            <a:r>
+              <a:rPr lang="ko-KR" altLang="en-US" dirty="0"/>
+              <a:t>부터 지원</a:t>
+            </a:r>
+            <a:endParaRPr lang="en-US" altLang="ko-KR" dirty="0"/>
+          </a:p>
+          <a:p>
+            <a:r>
+              <a:rPr lang="en-US" altLang="ko-KR" dirty="0" err="1"/>
+              <a:t>LocalDateTime</a:t>
+            </a:r>
+            <a:r>
+              <a:rPr lang="en-US" altLang="ko-KR" dirty="0"/>
+              <a:t>, </a:t>
+            </a:r>
+            <a:r>
+              <a:rPr lang="en-US" altLang="ko-KR" dirty="0" err="1"/>
+              <a:t>LocalDate</a:t>
+            </a:r>
+            <a:r>
+              <a:rPr lang="en-US" altLang="ko-KR" dirty="0"/>
+              <a:t>, </a:t>
+            </a:r>
+            <a:r>
+              <a:rPr lang="en-US" altLang="ko-KR" dirty="0" err="1"/>
+              <a:t>LocalTime</a:t>
+            </a:r>
+            <a:r>
+              <a:rPr lang="en-US" altLang="ko-KR" dirty="0"/>
+              <a:t> </a:t>
+            </a:r>
+            <a:r>
+              <a:rPr lang="ko-KR" altLang="en-US" dirty="0"/>
+              <a:t>클래스 등이 있다</a:t>
+            </a:r>
+            <a:r>
+              <a:rPr lang="en-US" altLang="ko-KR" dirty="0"/>
+              <a:t>.</a:t>
+            </a:r>
+            <a:endParaRPr lang="ko-KR" altLang="en-US" dirty="0"/>
+          </a:p>
+        </p:txBody>
+      </p:sp>
+    </p:spTree>
+    <p:extLst>
+      <p:ext uri="{BB962C8B-B14F-4D97-AF65-F5344CB8AC3E}">
+        <p14:creationId xmlns:p14="http://schemas.microsoft.com/office/powerpoint/2010/main" val="3238267849"/>
+      </p:ext>
+    </p:extLst>
+  </p:cSld>
+  <p:clrMapOvr>
+    <a:masterClrMapping/>
+  </p:clrMapOvr>
+</p:sld>
+</file>
+
+<file path=ppt/slides/slide24.xml><?xml version="1.0" encoding="utf-8"?>
+<p:sld xmlns:a="http://schemas.openxmlformats.org/drawingml/2006/main" xmlns:r="http://schemas.openxmlformats.org/officeDocument/2006/relationships" xmlns:p="http://schemas.openxmlformats.org/presentationml/2006/main">
+  <p:cSld>
+    <p:spTree>
+      <p:nvGrpSpPr>
+        <p:cNvPr id="1" name=""/>
+        <p:cNvGrpSpPr/>
+        <p:nvPr/>
+      </p:nvGrpSpPr>
+      <p:grpSpPr>
+        <a:xfrm>
+          <a:off x="0" y="0"/>
+          <a:ext cx="0" cy="0"/>
+          <a:chOff x="0" y="0"/>
+          <a:chExt cx="0" cy="0"/>
+        </a:xfrm>
+      </p:grpSpPr>
+      <p:sp>
+        <p:nvSpPr>
+          <p:cNvPr id="2" name="제목 1">
+            <a:extLst>
+              <a:ext uri="{FF2B5EF4-FFF2-40B4-BE49-F238E27FC236}">
+                <a16:creationId xmlns:a16="http://schemas.microsoft.com/office/drawing/2014/main" id="{CF9CC485-51B5-4389-82AD-F2308E119A71}"/>
+              </a:ext>
+            </a:extLst>
+          </p:cNvPr>
+          <p:cNvSpPr>
+            <a:spLocks noGrp="1"/>
+          </p:cNvSpPr>
+          <p:nvPr>
+            <p:ph type="title"/>
+          </p:nvPr>
+        </p:nvSpPr>
+        <p:spPr/>
+        <p:txBody>
+          <a:bodyPr/>
+          <a:lstStyle/>
+          <a:p>
+            <a:r>
+              <a:rPr lang="en-US" altLang="ko-KR" dirty="0"/>
+              <a:t>Java IO </a:t>
+            </a:r>
+            <a:r>
+              <a:rPr lang="ko-KR" altLang="en-US" dirty="0"/>
+              <a:t>클래스</a:t>
+            </a:r>
+          </a:p>
+        </p:txBody>
+      </p:sp>
+      <p:pic>
+        <p:nvPicPr>
+          <p:cNvPr id="5" name="그림 4">
+            <a:extLst>
+              <a:ext uri="{FF2B5EF4-FFF2-40B4-BE49-F238E27FC236}">
+                <a16:creationId xmlns:a16="http://schemas.microsoft.com/office/drawing/2014/main" id="{3730042C-0C9E-446D-B05D-AD8C4AD24319}"/>
+              </a:ext>
+            </a:extLst>
+          </p:cNvPr>
+          <p:cNvPicPr>
+            <a:picLocks noChangeAspect="1"/>
+          </p:cNvPicPr>
+          <p:nvPr/>
+        </p:nvPicPr>
+        <p:blipFill>
+          <a:blip r:embed="rId2"/>
+          <a:stretch>
+            <a:fillRect/>
+          </a:stretch>
+        </p:blipFill>
+        <p:spPr>
+          <a:xfrm>
+            <a:off x="6170632" y="1136477"/>
+            <a:ext cx="6021368" cy="2072930"/>
+          </a:xfrm>
+          <a:prstGeom prst="rect">
+            <a:avLst/>
+          </a:prstGeom>
+        </p:spPr>
+      </p:pic>
+      <p:pic>
+        <p:nvPicPr>
+          <p:cNvPr id="7" name="그림 6">
+            <a:extLst>
+              <a:ext uri="{FF2B5EF4-FFF2-40B4-BE49-F238E27FC236}">
+                <a16:creationId xmlns:a16="http://schemas.microsoft.com/office/drawing/2014/main" id="{98FDC1A7-4670-4CA2-A4F7-7B23C8E4EFD3}"/>
+              </a:ext>
+            </a:extLst>
+          </p:cNvPr>
+          <p:cNvPicPr>
+            <a:picLocks noChangeAspect="1"/>
+          </p:cNvPicPr>
+          <p:nvPr/>
+        </p:nvPicPr>
+        <p:blipFill>
+          <a:blip r:embed="rId3"/>
+          <a:stretch>
+            <a:fillRect/>
+          </a:stretch>
+        </p:blipFill>
+        <p:spPr>
+          <a:xfrm>
+            <a:off x="1" y="1256609"/>
+            <a:ext cx="6165652" cy="1952798"/>
+          </a:xfrm>
+          <a:prstGeom prst="rect">
+            <a:avLst/>
+          </a:prstGeom>
+        </p:spPr>
+      </p:pic>
+      <p:sp>
+        <p:nvSpPr>
+          <p:cNvPr id="8" name="TextBox 7">
+            <a:extLst>
+              <a:ext uri="{FF2B5EF4-FFF2-40B4-BE49-F238E27FC236}">
+                <a16:creationId xmlns:a16="http://schemas.microsoft.com/office/drawing/2014/main" id="{73532F03-A4EC-46A8-B560-6C33151BD96D}"/>
+              </a:ext>
+            </a:extLst>
+          </p:cNvPr>
+          <p:cNvSpPr txBox="1"/>
+          <p:nvPr/>
+        </p:nvSpPr>
+        <p:spPr>
+          <a:xfrm>
+            <a:off x="1435884" y="2929496"/>
+            <a:ext cx="4914900" cy="369332"/>
+          </a:xfrm>
+          <a:prstGeom prst="rect">
+            <a:avLst/>
+          </a:prstGeom>
+          <a:noFill/>
+        </p:spPr>
+        <p:txBody>
+          <a:bodyPr wrap="square" rtlCol="0">
+            <a:spAutoFit/>
+          </a:bodyPr>
+          <a:lstStyle/>
+          <a:p>
+            <a:r>
+              <a:rPr lang="en-US" altLang="ko-KR" b="1" i="0" dirty="0" err="1">
+                <a:solidFill>
+                  <a:srgbClr val="7E41D9"/>
+                </a:solidFill>
+                <a:effectLst/>
+                <a:latin typeface="NanumGothic" panose="020D0604000000000000" pitchFamily="50" charset="-127"/>
+                <a:ea typeface="NanumGothic" panose="020D0604000000000000" pitchFamily="50" charset="-127"/>
+              </a:rPr>
+              <a:t>InputStream</a:t>
+            </a:r>
+            <a:r>
+              <a:rPr lang="en-US" altLang="ko-KR" b="1" i="0" dirty="0">
+                <a:solidFill>
+                  <a:srgbClr val="7E41D9"/>
+                </a:solidFill>
+                <a:effectLst/>
+                <a:latin typeface="NanumGothic" panose="020D0604000000000000" pitchFamily="50" charset="-127"/>
+                <a:ea typeface="NanumGothic" panose="020D0604000000000000" pitchFamily="50" charset="-127"/>
+              </a:rPr>
+              <a:t> / </a:t>
+            </a:r>
+            <a:r>
+              <a:rPr lang="en-US" altLang="ko-KR" b="1" i="0" dirty="0" err="1">
+                <a:solidFill>
+                  <a:srgbClr val="7E41D9"/>
+                </a:solidFill>
+                <a:effectLst/>
+                <a:latin typeface="NanumGothic" panose="020D0604000000000000" pitchFamily="50" charset="-127"/>
+                <a:ea typeface="NanumGothic" panose="020D0604000000000000" pitchFamily="50" charset="-127"/>
+              </a:rPr>
+              <a:t>OutputStream</a:t>
+            </a:r>
+            <a:endParaRPr lang="ko-KR" altLang="en-US" dirty="0"/>
+          </a:p>
+        </p:txBody>
+      </p:sp>
+      <p:sp>
+        <p:nvSpPr>
+          <p:cNvPr id="9" name="TextBox 8">
+            <a:extLst>
+              <a:ext uri="{FF2B5EF4-FFF2-40B4-BE49-F238E27FC236}">
+                <a16:creationId xmlns:a16="http://schemas.microsoft.com/office/drawing/2014/main" id="{676BFBCC-19E0-4E56-9B37-D7C67FB7304B}"/>
+              </a:ext>
+            </a:extLst>
+          </p:cNvPr>
+          <p:cNvSpPr txBox="1"/>
+          <p:nvPr/>
+        </p:nvSpPr>
+        <p:spPr>
+          <a:xfrm>
+            <a:off x="7606516" y="3298828"/>
+            <a:ext cx="3149600" cy="369332"/>
+          </a:xfrm>
+          <a:prstGeom prst="rect">
+            <a:avLst/>
+          </a:prstGeom>
+          <a:noFill/>
+        </p:spPr>
+        <p:txBody>
+          <a:bodyPr wrap="square" rtlCol="0">
+            <a:spAutoFit/>
+          </a:bodyPr>
+          <a:lstStyle/>
+          <a:p>
+            <a:r>
+              <a:rPr lang="en-US" altLang="ko-KR" b="1" i="0">
+                <a:solidFill>
+                  <a:srgbClr val="7E41D9"/>
+                </a:solidFill>
+                <a:effectLst/>
+                <a:latin typeface="NanumGothic" panose="020D0604000000000000" pitchFamily="50" charset="-127"/>
+                <a:ea typeface="NanumGothic" panose="020D0604000000000000" pitchFamily="50" charset="-127"/>
+              </a:rPr>
+              <a:t>Reader / Writer (</a:t>
+            </a:r>
+            <a:r>
+              <a:rPr lang="ko-KR" altLang="en-US" b="1" i="0">
+                <a:solidFill>
+                  <a:srgbClr val="7E41D9"/>
+                </a:solidFill>
+                <a:effectLst/>
+                <a:latin typeface="NanumGothic" panose="020D0604000000000000" pitchFamily="50" charset="-127"/>
+                <a:ea typeface="NanumGothic" panose="020D0604000000000000" pitchFamily="50" charset="-127"/>
+              </a:rPr>
+              <a:t>문자 입출력</a:t>
+            </a:r>
+            <a:r>
+              <a:rPr lang="en-US" altLang="ko-KR" b="1" i="0">
+                <a:solidFill>
+                  <a:srgbClr val="7E41D9"/>
+                </a:solidFill>
+                <a:effectLst/>
+                <a:latin typeface="NanumGothic" panose="020D0604000000000000" pitchFamily="50" charset="-127"/>
+                <a:ea typeface="NanumGothic" panose="020D0604000000000000" pitchFamily="50" charset="-127"/>
+              </a:rPr>
+              <a:t>)</a:t>
+            </a:r>
+            <a:endParaRPr lang="ko-KR" altLang="en-US" dirty="0"/>
+          </a:p>
+        </p:txBody>
+      </p:sp>
+      <p:graphicFrame>
+        <p:nvGraphicFramePr>
+          <p:cNvPr id="10" name="표 9">
+            <a:extLst>
+              <a:ext uri="{FF2B5EF4-FFF2-40B4-BE49-F238E27FC236}">
+                <a16:creationId xmlns:a16="http://schemas.microsoft.com/office/drawing/2014/main" id="{BB1F04E3-1F7C-473F-81C1-7497DFDB972D}"/>
+              </a:ext>
+            </a:extLst>
+          </p:cNvPr>
+          <p:cNvGraphicFramePr>
+            <a:graphicFrameLocks noGrp="1"/>
+          </p:cNvGraphicFramePr>
+          <p:nvPr>
+            <p:extLst>
+              <p:ext uri="{D42A27DB-BD31-4B8C-83A1-F6EECF244321}">
+                <p14:modId xmlns:p14="http://schemas.microsoft.com/office/powerpoint/2010/main" val="1672708257"/>
+              </p:ext>
+            </p:extLst>
+          </p:nvPr>
+        </p:nvGraphicFramePr>
+        <p:xfrm>
+          <a:off x="399082" y="3308411"/>
+          <a:ext cx="5401611" cy="1584960"/>
+        </p:xfrm>
+        <a:graphic>
+          <a:graphicData uri="http://schemas.openxmlformats.org/drawingml/2006/table">
+            <a:tbl>
+              <a:tblPr/>
+              <a:tblGrid>
+                <a:gridCol w="2596928">
+                  <a:extLst>
+                    <a:ext uri="{9D8B030D-6E8A-4147-A177-3AD203B41FA5}">
+                      <a16:colId xmlns:a16="http://schemas.microsoft.com/office/drawing/2014/main" val="4048366474"/>
+                    </a:ext>
+                  </a:extLst>
+                </a:gridCol>
+                <a:gridCol w="2596928">
+                  <a:extLst>
+                    <a:ext uri="{9D8B030D-6E8A-4147-A177-3AD203B41FA5}">
+                      <a16:colId xmlns:a16="http://schemas.microsoft.com/office/drawing/2014/main" val="4019311592"/>
+                    </a:ext>
+                  </a:extLst>
+                </a:gridCol>
+                <a:gridCol w="207755">
+                  <a:extLst>
+                    <a:ext uri="{9D8B030D-6E8A-4147-A177-3AD203B41FA5}">
+                      <a16:colId xmlns:a16="http://schemas.microsoft.com/office/drawing/2014/main" val="3935151976"/>
+                    </a:ext>
+                  </a:extLst>
+                </a:gridCol>
+              </a:tblGrid>
+              <a:tr h="472017">
+                <a:tc>
+                  <a:txBody>
+                    <a:bodyPr/>
+                    <a:lstStyle/>
+                    <a:p>
+                      <a:pPr algn="ctr" rtl="0" fontAlgn="t">
+                        <a:spcBef>
+                          <a:spcPts val="0"/>
+                        </a:spcBef>
+                        <a:spcAft>
+                          <a:spcPts val="0"/>
+                        </a:spcAft>
+                      </a:pPr>
+                      <a:r>
+                        <a:rPr lang="ko-KR" altLang="en-US" sz="1200" b="1" i="0" u="none" strike="noStrike">
+                          <a:solidFill>
+                            <a:srgbClr val="000000"/>
+                          </a:solidFill>
+                          <a:effectLst/>
+                          <a:latin typeface="Arial" panose="020B0604020202020204" pitchFamily="34" charset="0"/>
+                        </a:rPr>
+                        <a:t>바이트 기반 스트림</a:t>
+                      </a:r>
+                      <a:endParaRPr lang="ko-KR" altLang="en-US">
+                        <a:solidFill>
+                          <a:srgbClr val="666666"/>
+                        </a:solidFill>
+                        <a:effectLst/>
+                      </a:endParaRPr>
+                    </a:p>
+                  </a:txBody>
+                  <a:tcPr marL="63500" marR="63500" marT="63500" marB="63500">
+                    <a:lnL w="12700" cap="flat" cmpd="sng" algn="ctr">
+                      <a:solidFill>
+                        <a:srgbClr val="000000"/>
+                      </a:solidFill>
+                      <a:prstDash val="solid"/>
+                      <a:round/>
+                      <a:headEnd type="none" w="med" len="med"/>
+                      <a:tailEnd type="none" w="med" len="med"/>
+                    </a:lnL>
+                    <a:lnR w="12700" cap="flat" cmpd="sng" algn="ctr">
+                      <a:solidFill>
+                        <a:srgbClr val="000000"/>
+                      </a:solidFill>
+                      <a:prstDash val="solid"/>
+                      <a:round/>
+                      <a:headEnd type="none" w="med" len="med"/>
+                      <a:tailEnd type="none" w="med" len="med"/>
+                    </a:lnR>
+                    <a:lnT w="12700" cap="flat" cmpd="sng" algn="ctr">
+                      <a:solidFill>
+                        <a:srgbClr val="000000"/>
+                      </a:solidFill>
+                      <a:prstDash val="solid"/>
+                      <a:round/>
+                      <a:headEnd type="none" w="med" len="med"/>
+                      <a:tailEnd type="none" w="med" len="med"/>
+                    </a:lnT>
+                    <a:lnB w="12700" cap="flat" cmpd="sng" algn="ctr">
+                      <a:solidFill>
+                        <a:srgbClr val="000000"/>
+                      </a:solidFill>
+                      <a:prstDash val="solid"/>
+                      <a:round/>
+                      <a:headEnd type="none" w="med" len="med"/>
+                      <a:tailEnd type="none" w="med" len="med"/>
+                    </a:lnB>
+                  </a:tcPr>
+                </a:tc>
+                <a:tc>
+                  <a:txBody>
+                    <a:bodyPr/>
+                    <a:lstStyle/>
+                    <a:p>
+                      <a:pPr algn="ctr" rtl="0" fontAlgn="t">
+                        <a:spcBef>
+                          <a:spcPts val="0"/>
+                        </a:spcBef>
+                        <a:spcAft>
+                          <a:spcPts val="0"/>
+                        </a:spcAft>
+                      </a:pPr>
+                      <a:r>
+                        <a:rPr lang="ko-KR" altLang="en-US" sz="1200" b="1" i="0" u="none" strike="noStrike">
+                          <a:solidFill>
+                            <a:srgbClr val="000000"/>
+                          </a:solidFill>
+                          <a:effectLst/>
+                          <a:latin typeface="Arial" panose="020B0604020202020204" pitchFamily="34" charset="0"/>
+                        </a:rPr>
+                        <a:t>문자 기반 스트림</a:t>
+                      </a:r>
+                      <a:endParaRPr lang="ko-KR" altLang="en-US">
+                        <a:solidFill>
+                          <a:srgbClr val="666666"/>
+                        </a:solidFill>
+                        <a:effectLst/>
+                      </a:endParaRPr>
+                    </a:p>
+                  </a:txBody>
+                  <a:tcPr marL="63500" marR="63500" marT="63500" marB="63500">
+                    <a:lnL w="12700" cap="flat" cmpd="sng" algn="ctr">
+                      <a:solidFill>
+                        <a:srgbClr val="000000"/>
+                      </a:solidFill>
+                      <a:prstDash val="solid"/>
+                      <a:round/>
+                      <a:headEnd type="none" w="med" len="med"/>
+                      <a:tailEnd type="none" w="med" len="med"/>
+                    </a:lnL>
+                    <a:lnR w="12700" cap="flat" cmpd="sng" algn="ctr">
+                      <a:solidFill>
+                        <a:srgbClr val="000000"/>
+                      </a:solidFill>
+                      <a:prstDash val="solid"/>
+                      <a:round/>
+                      <a:headEnd type="none" w="med" len="med"/>
+                      <a:tailEnd type="none" w="med" len="med"/>
+                    </a:lnR>
+                    <a:lnT w="12700" cap="flat" cmpd="sng" algn="ctr">
+                      <a:solidFill>
+                        <a:srgbClr val="000000"/>
+                      </a:solidFill>
+                      <a:prstDash val="solid"/>
+                      <a:round/>
+                      <a:headEnd type="none" w="med" len="med"/>
+                      <a:tailEnd type="none" w="med" len="med"/>
+                    </a:lnT>
+                    <a:lnB w="12700" cap="flat" cmpd="sng" algn="ctr">
+                      <a:solidFill>
+                        <a:srgbClr val="000000"/>
+                      </a:solidFill>
+                      <a:prstDash val="solid"/>
+                      <a:round/>
+                      <a:headEnd type="none" w="med" len="med"/>
+                      <a:tailEnd type="none" w="med" len="med"/>
+                    </a:lnB>
+                  </a:tcPr>
+                </a:tc>
+                <a:tc>
+                  <a:txBody>
+                    <a:bodyPr/>
+                    <a:lstStyle/>
+                    <a:p>
+                      <a:pPr algn="ctr" rtl="0" fontAlgn="t">
+                        <a:spcBef>
+                          <a:spcPts val="0"/>
+                        </a:spcBef>
+                        <a:spcAft>
+                          <a:spcPts val="0"/>
+                        </a:spcAft>
+                      </a:pPr>
+                      <a:r>
+                        <a:rPr lang="ko-KR" altLang="en-US" sz="1200" b="1" i="0" u="none" strike="noStrike">
+                          <a:solidFill>
+                            <a:srgbClr val="000000"/>
+                          </a:solidFill>
+                          <a:effectLst/>
+                          <a:latin typeface="Arial" panose="020B0604020202020204" pitchFamily="34" charset="0"/>
+                        </a:rPr>
+                        <a:t>대상</a:t>
+                      </a:r>
+                      <a:endParaRPr lang="ko-KR" altLang="en-US">
+                        <a:solidFill>
+                          <a:srgbClr val="666666"/>
+                        </a:solidFill>
+                        <a:effectLst/>
+                      </a:endParaRPr>
+                    </a:p>
+                  </a:txBody>
+                  <a:tcPr marL="63500" marR="63500" marT="63500" marB="63500">
+                    <a:lnL w="12700" cap="flat" cmpd="sng" algn="ctr">
+                      <a:solidFill>
+                        <a:srgbClr val="000000"/>
+                      </a:solidFill>
+                      <a:prstDash val="solid"/>
+                      <a:round/>
+                      <a:headEnd type="none" w="med" len="med"/>
+                      <a:tailEnd type="none" w="med" len="med"/>
+                    </a:lnL>
+                    <a:lnR w="12700" cap="flat" cmpd="sng" algn="ctr">
+                      <a:solidFill>
+                        <a:srgbClr val="000000"/>
+                      </a:solidFill>
+                      <a:prstDash val="solid"/>
+                      <a:round/>
+                      <a:headEnd type="none" w="med" len="med"/>
+                      <a:tailEnd type="none" w="med" len="med"/>
+                    </a:lnR>
+                    <a:lnT w="12700" cap="flat" cmpd="sng" algn="ctr">
+                      <a:solidFill>
+                        <a:srgbClr val="000000"/>
+                      </a:solidFill>
+                      <a:prstDash val="solid"/>
+                      <a:round/>
+                      <a:headEnd type="none" w="med" len="med"/>
+                      <a:tailEnd type="none" w="med" len="med"/>
+                    </a:lnT>
+                    <a:lnB w="12700" cap="flat" cmpd="sng" algn="ctr">
+                      <a:solidFill>
+                        <a:srgbClr val="000000"/>
+                      </a:solidFill>
+                      <a:prstDash val="solid"/>
+                      <a:round/>
+                      <a:headEnd type="none" w="med" len="med"/>
+                      <a:tailEnd type="none" w="med" len="med"/>
+                    </a:lnB>
+                  </a:tcPr>
+                </a:tc>
+                <a:extLst>
+                  <a:ext uri="{0D108BD9-81ED-4DB2-BD59-A6C34878D82A}">
+                    <a16:rowId xmlns:a16="http://schemas.microsoft.com/office/drawing/2014/main" val="431745805"/>
+                  </a:ext>
+                </a:extLst>
+              </a:tr>
+              <a:tr h="442820">
+                <a:tc>
+                  <a:txBody>
+                    <a:bodyPr/>
+                    <a:lstStyle/>
+                    <a:p>
+                      <a:pPr algn="ctr" rtl="0" fontAlgn="t">
+                        <a:spcBef>
+                          <a:spcPts val="0"/>
+                        </a:spcBef>
+                        <a:spcAft>
+                          <a:spcPts val="0"/>
+                        </a:spcAft>
+                      </a:pPr>
+                      <a:r>
+                        <a:rPr lang="en-US" sz="1100" b="0" i="0" u="none" strike="noStrike">
+                          <a:solidFill>
+                            <a:srgbClr val="000000"/>
+                          </a:solidFill>
+                          <a:effectLst/>
+                          <a:latin typeface="Arial" panose="020B0604020202020204" pitchFamily="34" charset="0"/>
+                        </a:rPr>
+                        <a:t>FileInputStream</a:t>
+                      </a:r>
+                      <a:endParaRPr lang="en-US">
+                        <a:solidFill>
+                          <a:srgbClr val="666666"/>
+                        </a:solidFill>
+                        <a:effectLst/>
+                      </a:endParaRPr>
+                    </a:p>
+                    <a:p>
+                      <a:pPr algn="ctr" rtl="0" fontAlgn="t">
+                        <a:spcBef>
+                          <a:spcPts val="0"/>
+                        </a:spcBef>
+                        <a:spcAft>
+                          <a:spcPts val="0"/>
+                        </a:spcAft>
+                      </a:pPr>
+                      <a:r>
+                        <a:rPr lang="en-US" sz="1100" b="0" i="0" u="none" strike="noStrike">
+                          <a:solidFill>
+                            <a:srgbClr val="000000"/>
+                          </a:solidFill>
+                          <a:effectLst/>
+                          <a:latin typeface="Arial" panose="020B0604020202020204" pitchFamily="34" charset="0"/>
+                        </a:rPr>
+                        <a:t>FileOutputStream</a:t>
+                      </a:r>
+                      <a:endParaRPr lang="en-US">
+                        <a:solidFill>
+                          <a:srgbClr val="666666"/>
+                        </a:solidFill>
+                        <a:effectLst/>
+                      </a:endParaRPr>
+                    </a:p>
+                  </a:txBody>
+                  <a:tcPr marL="63500" marR="63500" marT="63500" marB="63500">
+                    <a:lnL w="12700" cap="flat" cmpd="sng" algn="ctr">
+                      <a:solidFill>
+                        <a:srgbClr val="000000"/>
+                      </a:solidFill>
+                      <a:prstDash val="solid"/>
+                      <a:round/>
+                      <a:headEnd type="none" w="med" len="med"/>
+                      <a:tailEnd type="none" w="med" len="med"/>
+                    </a:lnL>
+                    <a:lnR w="12700" cap="flat" cmpd="sng" algn="ctr">
+                      <a:solidFill>
+                        <a:srgbClr val="000000"/>
+                      </a:solidFill>
+                      <a:prstDash val="solid"/>
+                      <a:round/>
+                      <a:headEnd type="none" w="med" len="med"/>
+                      <a:tailEnd type="none" w="med" len="med"/>
+                    </a:lnR>
+                    <a:lnT w="12700" cap="flat" cmpd="sng" algn="ctr">
+                      <a:solidFill>
+                        <a:srgbClr val="000000"/>
+                      </a:solidFill>
+                      <a:prstDash val="solid"/>
+                      <a:round/>
+                      <a:headEnd type="none" w="med" len="med"/>
+                      <a:tailEnd type="none" w="med" len="med"/>
+                    </a:lnT>
+                    <a:lnB w="12700" cap="flat" cmpd="sng" algn="ctr">
+                      <a:solidFill>
+                        <a:srgbClr val="000000"/>
+                      </a:solidFill>
+                      <a:prstDash val="solid"/>
+                      <a:round/>
+                      <a:headEnd type="none" w="med" len="med"/>
+                      <a:tailEnd type="none" w="med" len="med"/>
+                    </a:lnB>
+                  </a:tcPr>
+                </a:tc>
+                <a:tc>
+                  <a:txBody>
+                    <a:bodyPr/>
+                    <a:lstStyle/>
+                    <a:p>
+                      <a:pPr algn="ctr" rtl="0" fontAlgn="t">
+                        <a:spcBef>
+                          <a:spcPts val="0"/>
+                        </a:spcBef>
+                        <a:spcAft>
+                          <a:spcPts val="0"/>
+                        </a:spcAft>
+                      </a:pPr>
+                      <a:r>
+                        <a:rPr lang="en-US" sz="1100" b="0" i="0" u="none" strike="noStrike">
+                          <a:solidFill>
+                            <a:srgbClr val="000000"/>
+                          </a:solidFill>
+                          <a:effectLst/>
+                          <a:latin typeface="Arial" panose="020B0604020202020204" pitchFamily="34" charset="0"/>
+                        </a:rPr>
+                        <a:t>FileReader</a:t>
+                      </a:r>
+                      <a:endParaRPr lang="en-US">
+                        <a:solidFill>
+                          <a:srgbClr val="666666"/>
+                        </a:solidFill>
+                        <a:effectLst/>
+                      </a:endParaRPr>
+                    </a:p>
+                    <a:p>
+                      <a:pPr algn="ctr" rtl="0" fontAlgn="t">
+                        <a:spcBef>
+                          <a:spcPts val="0"/>
+                        </a:spcBef>
+                        <a:spcAft>
+                          <a:spcPts val="0"/>
+                        </a:spcAft>
+                      </a:pPr>
+                      <a:r>
+                        <a:rPr lang="en-US" sz="1100" b="0" i="0" u="none" strike="noStrike">
+                          <a:solidFill>
+                            <a:srgbClr val="000000"/>
+                          </a:solidFill>
+                          <a:effectLst/>
+                          <a:latin typeface="Arial" panose="020B0604020202020204" pitchFamily="34" charset="0"/>
+                        </a:rPr>
+                        <a:t>FileWriter</a:t>
+                      </a:r>
+                      <a:endParaRPr lang="en-US">
+                        <a:solidFill>
+                          <a:srgbClr val="666666"/>
+                        </a:solidFill>
+                        <a:effectLst/>
+                      </a:endParaRPr>
+                    </a:p>
+                  </a:txBody>
+                  <a:tcPr marL="63500" marR="63500" marT="63500" marB="63500">
+                    <a:lnL w="12700" cap="flat" cmpd="sng" algn="ctr">
+                      <a:solidFill>
+                        <a:srgbClr val="000000"/>
+                      </a:solidFill>
+                      <a:prstDash val="solid"/>
+                      <a:round/>
+                      <a:headEnd type="none" w="med" len="med"/>
+                      <a:tailEnd type="none" w="med" len="med"/>
+                    </a:lnL>
+                    <a:lnR w="12700" cap="flat" cmpd="sng" algn="ctr">
+                      <a:solidFill>
+                        <a:srgbClr val="000000"/>
+                      </a:solidFill>
+                      <a:prstDash val="solid"/>
+                      <a:round/>
+                      <a:headEnd type="none" w="med" len="med"/>
+                      <a:tailEnd type="none" w="med" len="med"/>
+                    </a:lnR>
+                    <a:lnT w="12700" cap="flat" cmpd="sng" algn="ctr">
+                      <a:solidFill>
+                        <a:srgbClr val="000000"/>
+                      </a:solidFill>
+                      <a:prstDash val="solid"/>
+                      <a:round/>
+                      <a:headEnd type="none" w="med" len="med"/>
+                      <a:tailEnd type="none" w="med" len="med"/>
+                    </a:lnT>
+                    <a:lnB w="12700" cap="flat" cmpd="sng" algn="ctr">
+                      <a:solidFill>
+                        <a:srgbClr val="000000"/>
+                      </a:solidFill>
+                      <a:prstDash val="solid"/>
+                      <a:round/>
+                      <a:headEnd type="none" w="med" len="med"/>
+                      <a:tailEnd type="none" w="med" len="med"/>
+                    </a:lnB>
+                  </a:tcPr>
+                </a:tc>
+                <a:tc>
+                  <a:txBody>
+                    <a:bodyPr/>
+                    <a:lstStyle/>
+                    <a:p>
+                      <a:pPr algn="ctr" rtl="0" fontAlgn="t">
+                        <a:spcBef>
+                          <a:spcPts val="0"/>
+                        </a:spcBef>
+                        <a:spcAft>
+                          <a:spcPts val="0"/>
+                        </a:spcAft>
+                      </a:pPr>
+                      <a:r>
+                        <a:rPr lang="ko-KR" altLang="en-US" sz="1100" b="0" i="0" u="none" strike="noStrike" dirty="0">
+                          <a:solidFill>
+                            <a:srgbClr val="000000"/>
+                          </a:solidFill>
+                          <a:effectLst/>
+                          <a:latin typeface="Arial" panose="020B0604020202020204" pitchFamily="34" charset="0"/>
+                        </a:rPr>
+                        <a:t>파일</a:t>
+                      </a:r>
+                      <a:endParaRPr lang="ko-KR" altLang="en-US" dirty="0">
+                        <a:solidFill>
+                          <a:srgbClr val="666666"/>
+                        </a:solidFill>
+                        <a:effectLst/>
+                      </a:endParaRPr>
+                    </a:p>
+                  </a:txBody>
+                  <a:tcPr marL="63500" marR="63500" marT="63500" marB="63500">
+                    <a:lnL w="12700" cap="flat" cmpd="sng" algn="ctr">
+                      <a:solidFill>
+                        <a:srgbClr val="000000"/>
+                      </a:solidFill>
+                      <a:prstDash val="solid"/>
+                      <a:round/>
+                      <a:headEnd type="none" w="med" len="med"/>
+                      <a:tailEnd type="none" w="med" len="med"/>
+                    </a:lnL>
+                    <a:lnR w="12700" cap="flat" cmpd="sng" algn="ctr">
+                      <a:solidFill>
+                        <a:srgbClr val="000000"/>
+                      </a:solidFill>
+                      <a:prstDash val="solid"/>
+                      <a:round/>
+                      <a:headEnd type="none" w="med" len="med"/>
+                      <a:tailEnd type="none" w="med" len="med"/>
+                    </a:lnR>
+                    <a:lnT w="12700" cap="flat" cmpd="sng" algn="ctr">
+                      <a:solidFill>
+                        <a:srgbClr val="000000"/>
+                      </a:solidFill>
+                      <a:prstDash val="solid"/>
+                      <a:round/>
+                      <a:headEnd type="none" w="med" len="med"/>
+                      <a:tailEnd type="none" w="med" len="med"/>
+                    </a:lnT>
+                    <a:lnB w="12700" cap="flat" cmpd="sng" algn="ctr">
+                      <a:solidFill>
+                        <a:srgbClr val="000000"/>
+                      </a:solidFill>
+                      <a:prstDash val="solid"/>
+                      <a:round/>
+                      <a:headEnd type="none" w="med" len="med"/>
+                      <a:tailEnd type="none" w="med" len="med"/>
+                    </a:lnB>
+                  </a:tcPr>
+                </a:tc>
+                <a:extLst>
+                  <a:ext uri="{0D108BD9-81ED-4DB2-BD59-A6C34878D82A}">
+                    <a16:rowId xmlns:a16="http://schemas.microsoft.com/office/drawing/2014/main" val="1525716245"/>
+                  </a:ext>
+                </a:extLst>
+              </a:tr>
+              <a:tr h="603403">
+                <a:tc>
+                  <a:txBody>
+                    <a:bodyPr/>
+                    <a:lstStyle/>
+                    <a:p>
+                      <a:pPr algn="ctr" rtl="0" fontAlgn="t">
+                        <a:spcBef>
+                          <a:spcPts val="0"/>
+                        </a:spcBef>
+                        <a:spcAft>
+                          <a:spcPts val="0"/>
+                        </a:spcAft>
+                      </a:pPr>
+                      <a:r>
+                        <a:rPr lang="en-US" sz="1100" b="0" i="0" u="none" strike="noStrike">
+                          <a:solidFill>
+                            <a:srgbClr val="000000"/>
+                          </a:solidFill>
+                          <a:effectLst/>
+                          <a:latin typeface="Arial" panose="020B0604020202020204" pitchFamily="34" charset="0"/>
+                        </a:rPr>
+                        <a:t>ByteArrayInputStream</a:t>
+                      </a:r>
+                      <a:endParaRPr lang="en-US">
+                        <a:solidFill>
+                          <a:srgbClr val="666666"/>
+                        </a:solidFill>
+                        <a:effectLst/>
+                      </a:endParaRPr>
+                    </a:p>
+                    <a:p>
+                      <a:pPr algn="ctr" rtl="0" fontAlgn="t">
+                        <a:spcBef>
+                          <a:spcPts val="0"/>
+                        </a:spcBef>
+                        <a:spcAft>
+                          <a:spcPts val="0"/>
+                        </a:spcAft>
+                      </a:pPr>
+                      <a:r>
+                        <a:rPr lang="en-US" sz="1100" b="0" i="0" u="none" strike="noStrike">
+                          <a:solidFill>
+                            <a:srgbClr val="000000"/>
+                          </a:solidFill>
+                          <a:effectLst/>
+                          <a:latin typeface="Arial" panose="020B0604020202020204" pitchFamily="34" charset="0"/>
+                        </a:rPr>
+                        <a:t>ByteArrayOutputStream</a:t>
+                      </a:r>
+                      <a:endParaRPr lang="en-US">
+                        <a:solidFill>
+                          <a:srgbClr val="666666"/>
+                        </a:solidFill>
+                        <a:effectLst/>
+                      </a:endParaRPr>
+                    </a:p>
+                  </a:txBody>
+                  <a:tcPr marL="63500" marR="63500" marT="63500" marB="63500">
+                    <a:lnL w="12700" cap="flat" cmpd="sng" algn="ctr">
+                      <a:solidFill>
+                        <a:srgbClr val="000000"/>
+                      </a:solidFill>
+                      <a:prstDash val="solid"/>
+                      <a:round/>
+                      <a:headEnd type="none" w="med" len="med"/>
+                      <a:tailEnd type="none" w="med" len="med"/>
+                    </a:lnL>
+                    <a:lnR w="12700" cap="flat" cmpd="sng" algn="ctr">
+                      <a:solidFill>
+                        <a:srgbClr val="000000"/>
+                      </a:solidFill>
+                      <a:prstDash val="solid"/>
+                      <a:round/>
+                      <a:headEnd type="none" w="med" len="med"/>
+                      <a:tailEnd type="none" w="med" len="med"/>
+                    </a:lnR>
+                    <a:lnT w="12700" cap="flat" cmpd="sng" algn="ctr">
+                      <a:solidFill>
+                        <a:srgbClr val="000000"/>
+                      </a:solidFill>
+                      <a:prstDash val="solid"/>
+                      <a:round/>
+                      <a:headEnd type="none" w="med" len="med"/>
+                      <a:tailEnd type="none" w="med" len="med"/>
+                    </a:lnT>
+                    <a:lnB w="12700" cap="flat" cmpd="sng" algn="ctr">
+                      <a:solidFill>
+                        <a:srgbClr val="000000"/>
+                      </a:solidFill>
+                      <a:prstDash val="solid"/>
+                      <a:round/>
+                      <a:headEnd type="none" w="med" len="med"/>
+                      <a:tailEnd type="none" w="med" len="med"/>
+                    </a:lnB>
+                  </a:tcPr>
+                </a:tc>
+                <a:tc>
+                  <a:txBody>
+                    <a:bodyPr/>
+                    <a:lstStyle/>
+                    <a:p>
+                      <a:pPr algn="ctr" rtl="0" fontAlgn="t">
+                        <a:spcBef>
+                          <a:spcPts val="0"/>
+                        </a:spcBef>
+                        <a:spcAft>
+                          <a:spcPts val="0"/>
+                        </a:spcAft>
+                      </a:pPr>
+                      <a:r>
+                        <a:rPr lang="en-US" sz="1100" b="0" i="0" u="none" strike="noStrike" dirty="0" err="1">
+                          <a:solidFill>
+                            <a:srgbClr val="000000"/>
+                          </a:solidFill>
+                          <a:effectLst/>
+                          <a:latin typeface="Arial" panose="020B0604020202020204" pitchFamily="34" charset="0"/>
+                        </a:rPr>
+                        <a:t>CharArrayReader</a:t>
+                      </a:r>
+                      <a:endParaRPr lang="en-US" dirty="0">
+                        <a:solidFill>
+                          <a:srgbClr val="666666"/>
+                        </a:solidFill>
+                        <a:effectLst/>
+                      </a:endParaRPr>
+                    </a:p>
+                    <a:p>
+                      <a:pPr algn="ctr" rtl="0" fontAlgn="t">
+                        <a:spcBef>
+                          <a:spcPts val="0"/>
+                        </a:spcBef>
+                        <a:spcAft>
+                          <a:spcPts val="0"/>
+                        </a:spcAft>
+                      </a:pPr>
+                      <a:r>
+                        <a:rPr lang="en-US" sz="1100" b="0" i="0" u="none" strike="noStrike" dirty="0" err="1">
+                          <a:solidFill>
+                            <a:srgbClr val="000000"/>
+                          </a:solidFill>
+                          <a:effectLst/>
+                          <a:latin typeface="Arial" panose="020B0604020202020204" pitchFamily="34" charset="0"/>
+                        </a:rPr>
+                        <a:t>CharArrayWriter</a:t>
+                      </a:r>
+                      <a:endParaRPr lang="en-US" dirty="0">
+                        <a:solidFill>
+                          <a:srgbClr val="666666"/>
+                        </a:solidFill>
+                        <a:effectLst/>
+                      </a:endParaRPr>
+                    </a:p>
+                  </a:txBody>
+                  <a:tcPr marL="63500" marR="63500" marT="63500" marB="63500">
+                    <a:lnL w="12700" cap="flat" cmpd="sng" algn="ctr">
+                      <a:solidFill>
+                        <a:srgbClr val="000000"/>
+                      </a:solidFill>
+                      <a:prstDash val="solid"/>
+                      <a:round/>
+                      <a:headEnd type="none" w="med" len="med"/>
+                      <a:tailEnd type="none" w="med" len="med"/>
+                    </a:lnL>
+                    <a:lnR w="12700" cap="flat" cmpd="sng" algn="ctr">
+                      <a:solidFill>
+                        <a:srgbClr val="000000"/>
+                      </a:solidFill>
+                      <a:prstDash val="solid"/>
+                      <a:round/>
+                      <a:headEnd type="none" w="med" len="med"/>
+                      <a:tailEnd type="none" w="med" len="med"/>
+                    </a:lnR>
+                    <a:lnT w="12700" cap="flat" cmpd="sng" algn="ctr">
+                      <a:solidFill>
+                        <a:srgbClr val="000000"/>
+                      </a:solidFill>
+                      <a:prstDash val="solid"/>
+                      <a:round/>
+                      <a:headEnd type="none" w="med" len="med"/>
+                      <a:tailEnd type="none" w="med" len="med"/>
+                    </a:lnT>
+                    <a:lnB w="12700" cap="flat" cmpd="sng" algn="ctr">
+                      <a:solidFill>
+                        <a:srgbClr val="000000"/>
+                      </a:solidFill>
+                      <a:prstDash val="solid"/>
+                      <a:round/>
+                      <a:headEnd type="none" w="med" len="med"/>
+                      <a:tailEnd type="none" w="med" len="med"/>
+                    </a:lnB>
+                  </a:tcPr>
+                </a:tc>
+                <a:tc>
+                  <a:txBody>
+                    <a:bodyPr/>
+                    <a:lstStyle/>
+                    <a:p>
+                      <a:pPr algn="ctr" rtl="0" fontAlgn="t">
+                        <a:spcBef>
+                          <a:spcPts val="0"/>
+                        </a:spcBef>
+                        <a:spcAft>
+                          <a:spcPts val="0"/>
+                        </a:spcAft>
+                      </a:pPr>
+                      <a:r>
+                        <a:rPr lang="ko-KR" altLang="en-US" sz="1100" b="0" i="0" u="none" strike="noStrike" dirty="0">
+                          <a:solidFill>
+                            <a:srgbClr val="000000"/>
+                          </a:solidFill>
+                          <a:effectLst/>
+                          <a:latin typeface="Arial" panose="020B0604020202020204" pitchFamily="34" charset="0"/>
+                        </a:rPr>
+                        <a:t>메모리</a:t>
+                      </a:r>
+                      <a:endParaRPr lang="ko-KR" altLang="en-US" dirty="0">
+                        <a:solidFill>
+                          <a:srgbClr val="666666"/>
+                        </a:solidFill>
+                        <a:effectLst/>
+                      </a:endParaRPr>
+                    </a:p>
+                  </a:txBody>
+                  <a:tcPr marL="63500" marR="63500" marT="63500" marB="63500">
+                    <a:lnL w="12700" cap="flat" cmpd="sng" algn="ctr">
+                      <a:solidFill>
+                        <a:srgbClr val="000000"/>
+                      </a:solidFill>
+                      <a:prstDash val="solid"/>
+                      <a:round/>
+                      <a:headEnd type="none" w="med" len="med"/>
+                      <a:tailEnd type="none" w="med" len="med"/>
+                    </a:lnL>
+                    <a:lnR w="12700" cap="flat" cmpd="sng" algn="ctr">
+                      <a:solidFill>
+                        <a:srgbClr val="000000"/>
+                      </a:solidFill>
+                      <a:prstDash val="solid"/>
+                      <a:round/>
+                      <a:headEnd type="none" w="med" len="med"/>
+                      <a:tailEnd type="none" w="med" len="med"/>
+                    </a:lnR>
+                    <a:lnT w="12700" cap="flat" cmpd="sng" algn="ctr">
+                      <a:solidFill>
+                        <a:srgbClr val="000000"/>
+                      </a:solidFill>
+                      <a:prstDash val="solid"/>
+                      <a:round/>
+                      <a:headEnd type="none" w="med" len="med"/>
+                      <a:tailEnd type="none" w="med" len="med"/>
+                    </a:lnT>
+                    <a:lnB w="12700" cap="flat" cmpd="sng" algn="ctr">
+                      <a:solidFill>
+                        <a:srgbClr val="000000"/>
+                      </a:solidFill>
+                      <a:prstDash val="solid"/>
+                      <a:round/>
+                      <a:headEnd type="none" w="med" len="med"/>
+                      <a:tailEnd type="none" w="med" len="med"/>
+                    </a:lnB>
+                  </a:tcPr>
+                </a:tc>
+                <a:extLst>
+                  <a:ext uri="{0D108BD9-81ED-4DB2-BD59-A6C34878D82A}">
+                    <a16:rowId xmlns:a16="http://schemas.microsoft.com/office/drawing/2014/main" val="2213806907"/>
+                  </a:ext>
+                </a:extLst>
+              </a:tr>
+            </a:tbl>
+          </a:graphicData>
+        </a:graphic>
+      </p:graphicFrame>
+      <p:sp>
+        <p:nvSpPr>
+          <p:cNvPr id="11" name="Rectangle 1">
+            <a:extLst>
+              <a:ext uri="{FF2B5EF4-FFF2-40B4-BE49-F238E27FC236}">
+                <a16:creationId xmlns:a16="http://schemas.microsoft.com/office/drawing/2014/main" id="{ADADF235-7448-414A-9860-991142C96421}"/>
+              </a:ext>
+            </a:extLst>
+          </p:cNvPr>
+          <p:cNvSpPr>
+            <a:spLocks noChangeArrowheads="1"/>
+          </p:cNvSpPr>
+          <p:nvPr/>
+        </p:nvSpPr>
+        <p:spPr bwMode="auto">
+          <a:xfrm>
+            <a:off x="364961" y="3973354"/>
+            <a:ext cx="12192000" cy="0"/>
+          </a:xfrm>
+          <a:prstGeom prst="rect">
+            <a:avLst/>
+          </a:prstGeom>
+          <a:noFill/>
+          <a:ln>
+            <a:noFill/>
+          </a:ln>
+          <a:effectLst/>
+          <a:extLst>
+            <a:ext uri="{909E8E84-426E-40DD-AFC4-6F175D3DCCD1}">
+              <a14:hiddenFill xmlns:a14="http://schemas.microsoft.com/office/drawing/2010/main">
+                <a:solidFill>
+                  <a:schemeClr val="accent1"/>
+                </a:solidFill>
+              </a14:hiddenFill>
+            </a:ext>
+            <a:ext uri="{91240B29-F687-4F45-9708-019B960494DF}">
+              <a14:hiddenLine xmlns:a14="http://schemas.microsoft.com/office/drawing/2010/main" w="9525">
+                <a:solidFill>
+                  <a:schemeClr val="tx1"/>
+                </a:solidFill>
+                <a:miter lim="800000"/>
+                <a:headEnd/>
+                <a:tailEnd/>
+              </a14:hiddenLine>
+            </a:ext>
+            <a:ext uri="{AF507438-7753-43E0-B8FC-AC1667EBCBE1}">
+              <a14:hiddenEffects xmlns:a14="http://schemas.microsoft.com/office/drawing/2010/main">
+                <a:effectLst>
+                  <a:outerShdw dist="35921" dir="2700000" algn="ctr" rotWithShape="0">
+                    <a:schemeClr val="bg2"/>
+                  </a:outerShdw>
+                </a:effectLst>
+              </a14:hiddenEffects>
+            </a:ext>
+          </a:extLst>
+        </p:spPr>
+        <p:txBody>
+          <a:bodyPr vert="horz" wrap="none" lIns="0" tIns="0" rIns="0" bIns="0" numCol="1" anchor="ctr" anchorCtr="0" compatLnSpc="1">
+            <a:prstTxWarp prst="textNoShape">
+              <a:avLst/>
+            </a:prstTxWarp>
+            <a:spAutoFit/>
+          </a:bodyPr>
+          <a:lstStyle/>
+          <a:p>
+            <a:pPr marL="0" marR="0" lvl="0" indent="0" algn="l" defTabSz="914400" rtl="0" eaLnBrk="0" fontAlgn="base" latinLnBrk="0" hangingPunct="0">
+              <a:lnSpc>
+                <a:spcPct val="100000"/>
+              </a:lnSpc>
+              <a:spcBef>
+                <a:spcPct val="0"/>
+              </a:spcBef>
+              <a:spcAft>
+                <a:spcPct val="0"/>
+              </a:spcAft>
+              <a:buClrTx/>
+              <a:buSzTx/>
+              <a:buFontTx/>
+              <a:buNone/>
+              <a:tabLst/>
+            </a:pPr>
+            <a:br>
+              <a:rPr kumimoji="0" lang="ko-KR" altLang="ko-KR" sz="1200" b="0" i="0" u="none" strike="noStrike" cap="none" normalizeH="0" baseline="0">
+                <a:ln>
+                  <a:noFill/>
+                </a:ln>
+                <a:solidFill>
+                  <a:srgbClr val="000000"/>
+                </a:solidFill>
+                <a:effectLst/>
+                <a:latin typeface="Arial" panose="020B0604020202020204" pitchFamily="34" charset="0"/>
+                <a:ea typeface="Noto Sans KR"/>
+              </a:rPr>
+            </a:br>
+            <a:endParaRPr kumimoji="0" lang="ko-KR" altLang="ko-KR" sz="800" b="0" i="0" u="none" strike="noStrike" cap="none" normalizeH="0" baseline="0">
+              <a:ln>
+                <a:noFill/>
+              </a:ln>
+              <a:solidFill>
+                <a:schemeClr val="tx1"/>
+              </a:solidFill>
+              <a:effectLst/>
+              <a:latin typeface="Arial" panose="020B0604020202020204" pitchFamily="34" charset="0"/>
+            </a:endParaRPr>
+          </a:p>
+          <a:p>
+            <a:pPr marL="0" marR="0" lvl="0" indent="0" algn="l" defTabSz="914400" rtl="0" eaLnBrk="0" fontAlgn="base" latinLnBrk="0" hangingPunct="0">
+              <a:lnSpc>
+                <a:spcPct val="100000"/>
+              </a:lnSpc>
+              <a:spcBef>
+                <a:spcPct val="0"/>
+              </a:spcBef>
+              <a:spcAft>
+                <a:spcPct val="0"/>
+              </a:spcAft>
+              <a:buClrTx/>
+              <a:buSzTx/>
+              <a:buFontTx/>
+              <a:buNone/>
+              <a:tabLst/>
+            </a:pPr>
+            <a:br>
+              <a:rPr kumimoji="0" lang="ko-KR" altLang="ko-KR" sz="1800" b="0" i="0" u="none" strike="noStrike" cap="none" normalizeH="0" baseline="0">
+                <a:ln>
+                  <a:noFill/>
+                </a:ln>
+                <a:solidFill>
+                  <a:schemeClr val="tx1"/>
+                </a:solidFill>
+                <a:effectLst/>
+                <a:latin typeface="Arial" panose="020B0604020202020204" pitchFamily="34" charset="0"/>
+              </a:rPr>
+            </a:br>
+            <a:endParaRPr kumimoji="0" lang="ko-KR" altLang="ko-KR" sz="1800" b="0" i="0" u="none" strike="noStrike" cap="none" normalizeH="0" baseline="0">
+              <a:ln>
+                <a:noFill/>
+              </a:ln>
+              <a:solidFill>
+                <a:schemeClr val="tx1"/>
+              </a:solidFill>
+              <a:effectLst/>
+              <a:latin typeface="Arial" panose="020B0604020202020204" pitchFamily="34" charset="0"/>
+            </a:endParaRPr>
+          </a:p>
+        </p:txBody>
+      </p:sp>
+      <p:graphicFrame>
+        <p:nvGraphicFramePr>
+          <p:cNvPr id="12" name="표 11">
+            <a:extLst>
+              <a:ext uri="{FF2B5EF4-FFF2-40B4-BE49-F238E27FC236}">
+                <a16:creationId xmlns:a16="http://schemas.microsoft.com/office/drawing/2014/main" id="{9A3CC802-4493-4ABB-8781-379FF250F835}"/>
+              </a:ext>
+            </a:extLst>
+          </p:cNvPr>
+          <p:cNvGraphicFramePr>
+            <a:graphicFrameLocks noGrp="1"/>
+          </p:cNvGraphicFramePr>
+          <p:nvPr>
+            <p:extLst>
+              <p:ext uri="{D42A27DB-BD31-4B8C-83A1-F6EECF244321}">
+                <p14:modId xmlns:p14="http://schemas.microsoft.com/office/powerpoint/2010/main" val="3734272811"/>
+              </p:ext>
+            </p:extLst>
+          </p:nvPr>
+        </p:nvGraphicFramePr>
+        <p:xfrm>
+          <a:off x="399082" y="4905205"/>
+          <a:ext cx="5401611" cy="1854200"/>
+        </p:xfrm>
+        <a:graphic>
+          <a:graphicData uri="http://schemas.openxmlformats.org/drawingml/2006/table">
+            <a:tbl>
+              <a:tblPr/>
+              <a:tblGrid>
+                <a:gridCol w="1800537">
+                  <a:extLst>
+                    <a:ext uri="{9D8B030D-6E8A-4147-A177-3AD203B41FA5}">
+                      <a16:colId xmlns:a16="http://schemas.microsoft.com/office/drawing/2014/main" val="3144113752"/>
+                    </a:ext>
+                  </a:extLst>
+                </a:gridCol>
+                <a:gridCol w="1800537">
+                  <a:extLst>
+                    <a:ext uri="{9D8B030D-6E8A-4147-A177-3AD203B41FA5}">
+                      <a16:colId xmlns:a16="http://schemas.microsoft.com/office/drawing/2014/main" val="4246953349"/>
+                    </a:ext>
+                  </a:extLst>
+                </a:gridCol>
+                <a:gridCol w="1800537">
+                  <a:extLst>
+                    <a:ext uri="{9D8B030D-6E8A-4147-A177-3AD203B41FA5}">
+                      <a16:colId xmlns:a16="http://schemas.microsoft.com/office/drawing/2014/main" val="4060644194"/>
+                    </a:ext>
+                  </a:extLst>
+                </a:gridCol>
+              </a:tblGrid>
+              <a:tr h="0">
+                <a:tc>
+                  <a:txBody>
+                    <a:bodyPr/>
+                    <a:lstStyle/>
+                    <a:p>
+                      <a:pPr algn="ctr" rtl="0" fontAlgn="t">
+                        <a:spcBef>
+                          <a:spcPts val="0"/>
+                        </a:spcBef>
+                        <a:spcAft>
+                          <a:spcPts val="0"/>
+                        </a:spcAft>
+                      </a:pPr>
+                      <a:r>
+                        <a:rPr lang="ko-KR" altLang="en-US" sz="1200" b="1" i="0" u="none" strike="noStrike">
+                          <a:solidFill>
+                            <a:srgbClr val="000000"/>
+                          </a:solidFill>
+                          <a:effectLst/>
+                          <a:latin typeface="Arial" panose="020B0604020202020204" pitchFamily="34" charset="0"/>
+                        </a:rPr>
+                        <a:t>바이트 기반 보조스트림</a:t>
+                      </a:r>
+                      <a:endParaRPr lang="ko-KR" altLang="en-US">
+                        <a:solidFill>
+                          <a:srgbClr val="666666"/>
+                        </a:solidFill>
+                        <a:effectLst/>
+                      </a:endParaRPr>
+                    </a:p>
+                  </a:txBody>
+                  <a:tcPr marL="63500" marR="63500" marT="63500" marB="63500">
+                    <a:lnL w="12700" cap="flat" cmpd="sng" algn="ctr">
+                      <a:solidFill>
+                        <a:srgbClr val="000000"/>
+                      </a:solidFill>
+                      <a:prstDash val="solid"/>
+                      <a:round/>
+                      <a:headEnd type="none" w="med" len="med"/>
+                      <a:tailEnd type="none" w="med" len="med"/>
+                    </a:lnL>
+                    <a:lnR w="12700" cap="flat" cmpd="sng" algn="ctr">
+                      <a:solidFill>
+                        <a:srgbClr val="000000"/>
+                      </a:solidFill>
+                      <a:prstDash val="solid"/>
+                      <a:round/>
+                      <a:headEnd type="none" w="med" len="med"/>
+                      <a:tailEnd type="none" w="med" len="med"/>
+                    </a:lnR>
+                    <a:lnT w="12700" cap="flat" cmpd="sng" algn="ctr">
+                      <a:solidFill>
+                        <a:srgbClr val="000000"/>
+                      </a:solidFill>
+                      <a:prstDash val="solid"/>
+                      <a:round/>
+                      <a:headEnd type="none" w="med" len="med"/>
+                      <a:tailEnd type="none" w="med" len="med"/>
+                    </a:lnT>
+                    <a:lnB w="12700" cap="flat" cmpd="sng" algn="ctr">
+                      <a:solidFill>
+                        <a:srgbClr val="000000"/>
+                      </a:solidFill>
+                      <a:prstDash val="solid"/>
+                      <a:round/>
+                      <a:headEnd type="none" w="med" len="med"/>
+                      <a:tailEnd type="none" w="med" len="med"/>
+                    </a:lnB>
+                  </a:tcPr>
+                </a:tc>
+                <a:tc>
+                  <a:txBody>
+                    <a:bodyPr/>
+                    <a:lstStyle/>
+                    <a:p>
+                      <a:pPr algn="ctr" rtl="0" fontAlgn="t">
+                        <a:spcBef>
+                          <a:spcPts val="0"/>
+                        </a:spcBef>
+                        <a:spcAft>
+                          <a:spcPts val="0"/>
+                        </a:spcAft>
+                      </a:pPr>
+                      <a:r>
+                        <a:rPr lang="ko-KR" altLang="en-US" sz="1200" b="1" i="0" u="none" strike="noStrike">
+                          <a:solidFill>
+                            <a:srgbClr val="000000"/>
+                          </a:solidFill>
+                          <a:effectLst/>
+                          <a:latin typeface="Arial" panose="020B0604020202020204" pitchFamily="34" charset="0"/>
+                        </a:rPr>
+                        <a:t>문자 기반 보조 스트림</a:t>
+                      </a:r>
+                      <a:endParaRPr lang="ko-KR" altLang="en-US">
+                        <a:solidFill>
+                          <a:srgbClr val="666666"/>
+                        </a:solidFill>
+                        <a:effectLst/>
+                      </a:endParaRPr>
+                    </a:p>
+                  </a:txBody>
+                  <a:tcPr marL="63500" marR="63500" marT="63500" marB="63500">
+                    <a:lnL w="12700" cap="flat" cmpd="sng" algn="ctr">
+                      <a:solidFill>
+                        <a:srgbClr val="000000"/>
+                      </a:solidFill>
+                      <a:prstDash val="solid"/>
+                      <a:round/>
+                      <a:headEnd type="none" w="med" len="med"/>
+                      <a:tailEnd type="none" w="med" len="med"/>
+                    </a:lnL>
+                    <a:lnR w="12700" cap="flat" cmpd="sng" algn="ctr">
+                      <a:solidFill>
+                        <a:srgbClr val="000000"/>
+                      </a:solidFill>
+                      <a:prstDash val="solid"/>
+                      <a:round/>
+                      <a:headEnd type="none" w="med" len="med"/>
+                      <a:tailEnd type="none" w="med" len="med"/>
+                    </a:lnR>
+                    <a:lnT w="12700" cap="flat" cmpd="sng" algn="ctr">
+                      <a:solidFill>
+                        <a:srgbClr val="000000"/>
+                      </a:solidFill>
+                      <a:prstDash val="solid"/>
+                      <a:round/>
+                      <a:headEnd type="none" w="med" len="med"/>
+                      <a:tailEnd type="none" w="med" len="med"/>
+                    </a:lnT>
+                    <a:lnB w="12700" cap="flat" cmpd="sng" algn="ctr">
+                      <a:solidFill>
+                        <a:srgbClr val="000000"/>
+                      </a:solidFill>
+                      <a:prstDash val="solid"/>
+                      <a:round/>
+                      <a:headEnd type="none" w="med" len="med"/>
+                      <a:tailEnd type="none" w="med" len="med"/>
+                    </a:lnB>
+                  </a:tcPr>
+                </a:tc>
+                <a:tc>
+                  <a:txBody>
+                    <a:bodyPr/>
+                    <a:lstStyle/>
+                    <a:p>
+                      <a:pPr algn="ctr" rtl="0" fontAlgn="t">
+                        <a:spcBef>
+                          <a:spcPts val="0"/>
+                        </a:spcBef>
+                        <a:spcAft>
+                          <a:spcPts val="0"/>
+                        </a:spcAft>
+                      </a:pPr>
+                      <a:r>
+                        <a:rPr lang="ko-KR" altLang="en-US" sz="1200" b="1" i="0" u="none" strike="noStrike">
+                          <a:solidFill>
+                            <a:srgbClr val="000000"/>
+                          </a:solidFill>
+                          <a:effectLst/>
+                          <a:latin typeface="Arial" panose="020B0604020202020204" pitchFamily="34" charset="0"/>
+                        </a:rPr>
+                        <a:t>비고</a:t>
+                      </a:r>
+                      <a:endParaRPr lang="ko-KR" altLang="en-US">
+                        <a:solidFill>
+                          <a:srgbClr val="666666"/>
+                        </a:solidFill>
+                        <a:effectLst/>
+                      </a:endParaRPr>
+                    </a:p>
+                  </a:txBody>
+                  <a:tcPr marL="63500" marR="63500" marT="63500" marB="63500">
+                    <a:lnL w="12700" cap="flat" cmpd="sng" algn="ctr">
+                      <a:solidFill>
+                        <a:srgbClr val="000000"/>
+                      </a:solidFill>
+                      <a:prstDash val="solid"/>
+                      <a:round/>
+                      <a:headEnd type="none" w="med" len="med"/>
+                      <a:tailEnd type="none" w="med" len="med"/>
+                    </a:lnL>
+                    <a:lnR w="12700" cap="flat" cmpd="sng" algn="ctr">
+                      <a:solidFill>
+                        <a:srgbClr val="000000"/>
+                      </a:solidFill>
+                      <a:prstDash val="solid"/>
+                      <a:round/>
+                      <a:headEnd type="none" w="med" len="med"/>
+                      <a:tailEnd type="none" w="med" len="med"/>
+                    </a:lnR>
+                    <a:lnT w="12700" cap="flat" cmpd="sng" algn="ctr">
+                      <a:solidFill>
+                        <a:srgbClr val="000000"/>
+                      </a:solidFill>
+                      <a:prstDash val="solid"/>
+                      <a:round/>
+                      <a:headEnd type="none" w="med" len="med"/>
+                      <a:tailEnd type="none" w="med" len="med"/>
+                    </a:lnT>
+                    <a:lnB w="12700" cap="flat" cmpd="sng" algn="ctr">
+                      <a:solidFill>
+                        <a:srgbClr val="000000"/>
+                      </a:solidFill>
+                      <a:prstDash val="solid"/>
+                      <a:round/>
+                      <a:headEnd type="none" w="med" len="med"/>
+                      <a:tailEnd type="none" w="med" len="med"/>
+                    </a:lnB>
+                  </a:tcPr>
+                </a:tc>
+                <a:extLst>
+                  <a:ext uri="{0D108BD9-81ED-4DB2-BD59-A6C34878D82A}">
+                    <a16:rowId xmlns:a16="http://schemas.microsoft.com/office/drawing/2014/main" val="2519625098"/>
+                  </a:ext>
+                </a:extLst>
+              </a:tr>
+              <a:tr h="187903">
+                <a:tc>
+                  <a:txBody>
+                    <a:bodyPr/>
+                    <a:lstStyle/>
+                    <a:p>
+                      <a:pPr algn="ctr" rtl="0" fontAlgn="t">
+                        <a:spcBef>
+                          <a:spcPts val="0"/>
+                        </a:spcBef>
+                        <a:spcAft>
+                          <a:spcPts val="0"/>
+                        </a:spcAft>
+                      </a:pPr>
+                      <a:r>
+                        <a:rPr lang="en-US" sz="1100" b="0" i="0" u="none" strike="noStrike">
+                          <a:solidFill>
+                            <a:srgbClr val="000000"/>
+                          </a:solidFill>
+                          <a:effectLst/>
+                          <a:latin typeface="Arial" panose="020B0604020202020204" pitchFamily="34" charset="0"/>
+                        </a:rPr>
+                        <a:t>BufferedInputStream</a:t>
+                      </a:r>
+                      <a:endParaRPr lang="en-US">
+                        <a:solidFill>
+                          <a:srgbClr val="666666"/>
+                        </a:solidFill>
+                        <a:effectLst/>
+                      </a:endParaRPr>
+                    </a:p>
+                    <a:p>
+                      <a:pPr algn="ctr" rtl="0" fontAlgn="t">
+                        <a:spcBef>
+                          <a:spcPts val="0"/>
+                        </a:spcBef>
+                        <a:spcAft>
+                          <a:spcPts val="0"/>
+                        </a:spcAft>
+                      </a:pPr>
+                      <a:r>
+                        <a:rPr lang="en-US" sz="1100" b="0" i="0" u="none" strike="noStrike">
+                          <a:solidFill>
+                            <a:srgbClr val="000000"/>
+                          </a:solidFill>
+                          <a:effectLst/>
+                          <a:latin typeface="Arial" panose="020B0604020202020204" pitchFamily="34" charset="0"/>
+                        </a:rPr>
+                        <a:t>BufferedOutputStream</a:t>
+                      </a:r>
+                      <a:endParaRPr lang="en-US">
+                        <a:solidFill>
+                          <a:srgbClr val="666666"/>
+                        </a:solidFill>
+                        <a:effectLst/>
+                      </a:endParaRPr>
+                    </a:p>
+                  </a:txBody>
+                  <a:tcPr marL="63500" marR="63500" marT="63500" marB="63500">
+                    <a:lnL w="12700" cap="flat" cmpd="sng" algn="ctr">
+                      <a:solidFill>
+                        <a:srgbClr val="000000"/>
+                      </a:solidFill>
+                      <a:prstDash val="solid"/>
+                      <a:round/>
+                      <a:headEnd type="none" w="med" len="med"/>
+                      <a:tailEnd type="none" w="med" len="med"/>
+                    </a:lnL>
+                    <a:lnR w="12700" cap="flat" cmpd="sng" algn="ctr">
+                      <a:solidFill>
+                        <a:srgbClr val="000000"/>
+                      </a:solidFill>
+                      <a:prstDash val="solid"/>
+                      <a:round/>
+                      <a:headEnd type="none" w="med" len="med"/>
+                      <a:tailEnd type="none" w="med" len="med"/>
+                    </a:lnR>
+                    <a:lnT w="12700" cap="flat" cmpd="sng" algn="ctr">
+                      <a:solidFill>
+                        <a:srgbClr val="000000"/>
+                      </a:solidFill>
+                      <a:prstDash val="solid"/>
+                      <a:round/>
+                      <a:headEnd type="none" w="med" len="med"/>
+                      <a:tailEnd type="none" w="med" len="med"/>
+                    </a:lnT>
+                    <a:lnB w="12700" cap="flat" cmpd="sng" algn="ctr">
+                      <a:solidFill>
+                        <a:srgbClr val="000000"/>
+                      </a:solidFill>
+                      <a:prstDash val="solid"/>
+                      <a:round/>
+                      <a:headEnd type="none" w="med" len="med"/>
+                      <a:tailEnd type="none" w="med" len="med"/>
+                    </a:lnB>
+                  </a:tcPr>
+                </a:tc>
+                <a:tc>
+                  <a:txBody>
+                    <a:bodyPr/>
+                    <a:lstStyle/>
+                    <a:p>
+                      <a:pPr algn="ctr" rtl="0" fontAlgn="t">
+                        <a:spcBef>
+                          <a:spcPts val="0"/>
+                        </a:spcBef>
+                        <a:spcAft>
+                          <a:spcPts val="0"/>
+                        </a:spcAft>
+                      </a:pPr>
+                      <a:r>
+                        <a:rPr lang="en-US" sz="1100" b="0" i="0" u="none" strike="noStrike">
+                          <a:solidFill>
+                            <a:srgbClr val="000000"/>
+                          </a:solidFill>
+                          <a:effectLst/>
+                          <a:latin typeface="Arial" panose="020B0604020202020204" pitchFamily="34" charset="0"/>
+                        </a:rPr>
+                        <a:t>BufferedReader</a:t>
+                      </a:r>
+                      <a:endParaRPr lang="en-US">
+                        <a:solidFill>
+                          <a:srgbClr val="666666"/>
+                        </a:solidFill>
+                        <a:effectLst/>
+                      </a:endParaRPr>
+                    </a:p>
+                    <a:p>
+                      <a:pPr algn="ctr" rtl="0" fontAlgn="t">
+                        <a:spcBef>
+                          <a:spcPts val="0"/>
+                        </a:spcBef>
+                        <a:spcAft>
+                          <a:spcPts val="0"/>
+                        </a:spcAft>
+                      </a:pPr>
+                      <a:r>
+                        <a:rPr lang="en-US" sz="1100" b="0" i="0" u="none" strike="noStrike">
+                          <a:solidFill>
+                            <a:srgbClr val="000000"/>
+                          </a:solidFill>
+                          <a:effectLst/>
+                          <a:latin typeface="Arial" panose="020B0604020202020204" pitchFamily="34" charset="0"/>
+                        </a:rPr>
+                        <a:t>BufferedWriter</a:t>
+                      </a:r>
+                      <a:endParaRPr lang="en-US">
+                        <a:solidFill>
+                          <a:srgbClr val="666666"/>
+                        </a:solidFill>
+                        <a:effectLst/>
+                      </a:endParaRPr>
+                    </a:p>
+                  </a:txBody>
+                  <a:tcPr marL="63500" marR="63500" marT="63500" marB="63500">
+                    <a:lnL w="12700" cap="flat" cmpd="sng" algn="ctr">
+                      <a:solidFill>
+                        <a:srgbClr val="000000"/>
+                      </a:solidFill>
+                      <a:prstDash val="solid"/>
+                      <a:round/>
+                      <a:headEnd type="none" w="med" len="med"/>
+                      <a:tailEnd type="none" w="med" len="med"/>
+                    </a:lnL>
+                    <a:lnR w="12700" cap="flat" cmpd="sng" algn="ctr">
+                      <a:solidFill>
+                        <a:srgbClr val="000000"/>
+                      </a:solidFill>
+                      <a:prstDash val="solid"/>
+                      <a:round/>
+                      <a:headEnd type="none" w="med" len="med"/>
+                      <a:tailEnd type="none" w="med" len="med"/>
+                    </a:lnR>
+                    <a:lnT w="12700" cap="flat" cmpd="sng" algn="ctr">
+                      <a:solidFill>
+                        <a:srgbClr val="000000"/>
+                      </a:solidFill>
+                      <a:prstDash val="solid"/>
+                      <a:round/>
+                      <a:headEnd type="none" w="med" len="med"/>
+                      <a:tailEnd type="none" w="med" len="med"/>
+                    </a:lnT>
+                    <a:lnB w="12700" cap="flat" cmpd="sng" algn="ctr">
+                      <a:solidFill>
+                        <a:srgbClr val="000000"/>
+                      </a:solidFill>
+                      <a:prstDash val="solid"/>
+                      <a:round/>
+                      <a:headEnd type="none" w="med" len="med"/>
+                      <a:tailEnd type="none" w="med" len="med"/>
+                    </a:lnB>
+                  </a:tcPr>
+                </a:tc>
+                <a:tc>
+                  <a:txBody>
+                    <a:bodyPr/>
+                    <a:lstStyle/>
+                    <a:p>
+                      <a:pPr algn="ctr" rtl="0" fontAlgn="t">
+                        <a:spcBef>
+                          <a:spcPts val="0"/>
+                        </a:spcBef>
+                        <a:spcAft>
+                          <a:spcPts val="0"/>
+                        </a:spcAft>
+                      </a:pPr>
+                      <a:r>
+                        <a:rPr lang="ko-KR" altLang="en-US" sz="1100" b="0" i="0" u="none" strike="noStrike">
+                          <a:solidFill>
+                            <a:srgbClr val="000000"/>
+                          </a:solidFill>
+                          <a:effectLst/>
+                          <a:latin typeface="Arial" panose="020B0604020202020204" pitchFamily="34" charset="0"/>
+                        </a:rPr>
+                        <a:t>버퍼를 이용한 입출력 성능 향상</a:t>
+                      </a:r>
+                      <a:endParaRPr lang="ko-KR" altLang="en-US">
+                        <a:solidFill>
+                          <a:srgbClr val="666666"/>
+                        </a:solidFill>
+                        <a:effectLst/>
+                      </a:endParaRPr>
+                    </a:p>
+                  </a:txBody>
+                  <a:tcPr marL="63500" marR="63500" marT="63500" marB="63500">
+                    <a:lnL w="12700" cap="flat" cmpd="sng" algn="ctr">
+                      <a:solidFill>
+                        <a:srgbClr val="000000"/>
+                      </a:solidFill>
+                      <a:prstDash val="solid"/>
+                      <a:round/>
+                      <a:headEnd type="none" w="med" len="med"/>
+                      <a:tailEnd type="none" w="med" len="med"/>
+                    </a:lnL>
+                    <a:lnR w="12700" cap="flat" cmpd="sng" algn="ctr">
+                      <a:solidFill>
+                        <a:srgbClr val="000000"/>
+                      </a:solidFill>
+                      <a:prstDash val="solid"/>
+                      <a:round/>
+                      <a:headEnd type="none" w="med" len="med"/>
+                      <a:tailEnd type="none" w="med" len="med"/>
+                    </a:lnR>
+                    <a:lnT w="12700" cap="flat" cmpd="sng" algn="ctr">
+                      <a:solidFill>
+                        <a:srgbClr val="000000"/>
+                      </a:solidFill>
+                      <a:prstDash val="solid"/>
+                      <a:round/>
+                      <a:headEnd type="none" w="med" len="med"/>
+                      <a:tailEnd type="none" w="med" len="med"/>
+                    </a:lnT>
+                    <a:lnB w="12700" cap="flat" cmpd="sng" algn="ctr">
+                      <a:solidFill>
+                        <a:srgbClr val="000000"/>
+                      </a:solidFill>
+                      <a:prstDash val="solid"/>
+                      <a:round/>
+                      <a:headEnd type="none" w="med" len="med"/>
+                      <a:tailEnd type="none" w="med" len="med"/>
+                    </a:lnB>
+                  </a:tcPr>
+                </a:tc>
+                <a:extLst>
+                  <a:ext uri="{0D108BD9-81ED-4DB2-BD59-A6C34878D82A}">
+                    <a16:rowId xmlns:a16="http://schemas.microsoft.com/office/drawing/2014/main" val="2328873231"/>
+                  </a:ext>
+                </a:extLst>
+              </a:tr>
+              <a:tr h="187903">
+                <a:tc>
+                  <a:txBody>
+                    <a:bodyPr/>
+                    <a:lstStyle/>
+                    <a:p>
+                      <a:pPr algn="ctr" rtl="0" fontAlgn="t">
+                        <a:spcBef>
+                          <a:spcPts val="0"/>
+                        </a:spcBef>
+                        <a:spcAft>
+                          <a:spcPts val="0"/>
+                        </a:spcAft>
+                      </a:pPr>
+                      <a:r>
+                        <a:rPr lang="en-US" sz="1100" b="0" i="0" u="none" strike="noStrike">
+                          <a:solidFill>
+                            <a:srgbClr val="000000"/>
+                          </a:solidFill>
+                          <a:effectLst/>
+                          <a:latin typeface="Arial" panose="020B0604020202020204" pitchFamily="34" charset="0"/>
+                        </a:rPr>
+                        <a:t>FilterInputStream</a:t>
+                      </a:r>
+                      <a:endParaRPr lang="en-US">
+                        <a:solidFill>
+                          <a:srgbClr val="666666"/>
+                        </a:solidFill>
+                        <a:effectLst/>
+                      </a:endParaRPr>
+                    </a:p>
+                    <a:p>
+                      <a:pPr algn="ctr" rtl="0" fontAlgn="t">
+                        <a:spcBef>
+                          <a:spcPts val="0"/>
+                        </a:spcBef>
+                        <a:spcAft>
+                          <a:spcPts val="0"/>
+                        </a:spcAft>
+                      </a:pPr>
+                      <a:r>
+                        <a:rPr lang="en-US" sz="1100" b="0" i="0" u="none" strike="noStrike">
+                          <a:solidFill>
+                            <a:srgbClr val="000000"/>
+                          </a:solidFill>
+                          <a:effectLst/>
+                          <a:latin typeface="Arial" panose="020B0604020202020204" pitchFamily="34" charset="0"/>
+                        </a:rPr>
+                        <a:t>FilterOutputStream</a:t>
+                      </a:r>
+                      <a:endParaRPr lang="en-US">
+                        <a:solidFill>
+                          <a:srgbClr val="666666"/>
+                        </a:solidFill>
+                        <a:effectLst/>
+                      </a:endParaRPr>
+                    </a:p>
+                  </a:txBody>
+                  <a:tcPr marL="63500" marR="63500" marT="63500" marB="63500">
+                    <a:lnL w="12700" cap="flat" cmpd="sng" algn="ctr">
+                      <a:solidFill>
+                        <a:srgbClr val="000000"/>
+                      </a:solidFill>
+                      <a:prstDash val="solid"/>
+                      <a:round/>
+                      <a:headEnd type="none" w="med" len="med"/>
+                      <a:tailEnd type="none" w="med" len="med"/>
+                    </a:lnL>
+                    <a:lnR w="12700" cap="flat" cmpd="sng" algn="ctr">
+                      <a:solidFill>
+                        <a:srgbClr val="000000"/>
+                      </a:solidFill>
+                      <a:prstDash val="solid"/>
+                      <a:round/>
+                      <a:headEnd type="none" w="med" len="med"/>
+                      <a:tailEnd type="none" w="med" len="med"/>
+                    </a:lnR>
+                    <a:lnT w="12700" cap="flat" cmpd="sng" algn="ctr">
+                      <a:solidFill>
+                        <a:srgbClr val="000000"/>
+                      </a:solidFill>
+                      <a:prstDash val="solid"/>
+                      <a:round/>
+                      <a:headEnd type="none" w="med" len="med"/>
+                      <a:tailEnd type="none" w="med" len="med"/>
+                    </a:lnT>
+                    <a:lnB w="12700" cap="flat" cmpd="sng" algn="ctr">
+                      <a:solidFill>
+                        <a:srgbClr val="000000"/>
+                      </a:solidFill>
+                      <a:prstDash val="solid"/>
+                      <a:round/>
+                      <a:headEnd type="none" w="med" len="med"/>
+                      <a:tailEnd type="none" w="med" len="med"/>
+                    </a:lnB>
+                  </a:tcPr>
+                </a:tc>
+                <a:tc>
+                  <a:txBody>
+                    <a:bodyPr/>
+                    <a:lstStyle/>
+                    <a:p>
+                      <a:pPr algn="ctr" rtl="0" fontAlgn="t">
+                        <a:spcBef>
+                          <a:spcPts val="0"/>
+                        </a:spcBef>
+                        <a:spcAft>
+                          <a:spcPts val="0"/>
+                        </a:spcAft>
+                      </a:pPr>
+                      <a:r>
+                        <a:rPr lang="en-US" sz="1100" b="0" i="0" u="none" strike="noStrike">
+                          <a:solidFill>
+                            <a:srgbClr val="000000"/>
+                          </a:solidFill>
+                          <a:effectLst/>
+                          <a:latin typeface="Arial" panose="020B0604020202020204" pitchFamily="34" charset="0"/>
+                        </a:rPr>
+                        <a:t>FilterReader</a:t>
+                      </a:r>
+                      <a:endParaRPr lang="en-US">
+                        <a:solidFill>
+                          <a:srgbClr val="666666"/>
+                        </a:solidFill>
+                        <a:effectLst/>
+                      </a:endParaRPr>
+                    </a:p>
+                    <a:p>
+                      <a:pPr algn="ctr" rtl="0" fontAlgn="t">
+                        <a:spcBef>
+                          <a:spcPts val="0"/>
+                        </a:spcBef>
+                        <a:spcAft>
+                          <a:spcPts val="0"/>
+                        </a:spcAft>
+                      </a:pPr>
+                      <a:r>
+                        <a:rPr lang="en-US" sz="1100" b="0" i="0" u="none" strike="noStrike">
+                          <a:solidFill>
+                            <a:srgbClr val="000000"/>
+                          </a:solidFill>
+                          <a:effectLst/>
+                          <a:latin typeface="Arial" panose="020B0604020202020204" pitchFamily="34" charset="0"/>
+                        </a:rPr>
+                        <a:t>FilterWriter</a:t>
+                      </a:r>
+                      <a:endParaRPr lang="en-US">
+                        <a:solidFill>
+                          <a:srgbClr val="666666"/>
+                        </a:solidFill>
+                        <a:effectLst/>
+                      </a:endParaRPr>
+                    </a:p>
+                  </a:txBody>
+                  <a:tcPr marL="63500" marR="63500" marT="63500" marB="63500">
+                    <a:lnL w="12700" cap="flat" cmpd="sng" algn="ctr">
+                      <a:solidFill>
+                        <a:srgbClr val="000000"/>
+                      </a:solidFill>
+                      <a:prstDash val="solid"/>
+                      <a:round/>
+                      <a:headEnd type="none" w="med" len="med"/>
+                      <a:tailEnd type="none" w="med" len="med"/>
+                    </a:lnL>
+                    <a:lnR w="12700" cap="flat" cmpd="sng" algn="ctr">
+                      <a:solidFill>
+                        <a:srgbClr val="000000"/>
+                      </a:solidFill>
+                      <a:prstDash val="solid"/>
+                      <a:round/>
+                      <a:headEnd type="none" w="med" len="med"/>
+                      <a:tailEnd type="none" w="med" len="med"/>
+                    </a:lnR>
+                    <a:lnT w="12700" cap="flat" cmpd="sng" algn="ctr">
+                      <a:solidFill>
+                        <a:srgbClr val="000000"/>
+                      </a:solidFill>
+                      <a:prstDash val="solid"/>
+                      <a:round/>
+                      <a:headEnd type="none" w="med" len="med"/>
+                      <a:tailEnd type="none" w="med" len="med"/>
+                    </a:lnT>
+                    <a:lnB w="12700" cap="flat" cmpd="sng" algn="ctr">
+                      <a:solidFill>
+                        <a:srgbClr val="000000"/>
+                      </a:solidFill>
+                      <a:prstDash val="solid"/>
+                      <a:round/>
+                      <a:headEnd type="none" w="med" len="med"/>
+                      <a:tailEnd type="none" w="med" len="med"/>
+                    </a:lnB>
+                  </a:tcPr>
+                </a:tc>
+                <a:tc>
+                  <a:txBody>
+                    <a:bodyPr/>
+                    <a:lstStyle/>
+                    <a:p>
+                      <a:pPr algn="ctr" rtl="0" fontAlgn="t">
+                        <a:spcBef>
+                          <a:spcPts val="0"/>
+                        </a:spcBef>
+                        <a:spcAft>
+                          <a:spcPts val="0"/>
+                        </a:spcAft>
+                      </a:pPr>
+                      <a:r>
+                        <a:rPr lang="ko-KR" altLang="en-US" sz="1100" b="0" i="0" u="none" strike="noStrike" dirty="0" err="1">
+                          <a:solidFill>
+                            <a:srgbClr val="000000"/>
+                          </a:solidFill>
+                          <a:effectLst/>
+                          <a:latin typeface="Arial" panose="020B0604020202020204" pitchFamily="34" charset="0"/>
+                        </a:rPr>
+                        <a:t>보조스트림</a:t>
+                      </a:r>
+                      <a:r>
+                        <a:rPr lang="ko-KR" altLang="en-US" sz="1100" b="0" i="0" u="none" strike="noStrike" dirty="0">
+                          <a:solidFill>
+                            <a:srgbClr val="000000"/>
+                          </a:solidFill>
+                          <a:effectLst/>
+                          <a:latin typeface="Arial" panose="020B0604020202020204" pitchFamily="34" charset="0"/>
+                        </a:rPr>
+                        <a:t> 최고 조상</a:t>
+                      </a:r>
+                      <a:endParaRPr lang="ko-KR" altLang="en-US" dirty="0">
+                        <a:solidFill>
+                          <a:srgbClr val="666666"/>
+                        </a:solidFill>
+                        <a:effectLst/>
+                      </a:endParaRPr>
+                    </a:p>
+                  </a:txBody>
+                  <a:tcPr marL="63500" marR="63500" marT="63500" marB="63500">
+                    <a:lnL w="12700" cap="flat" cmpd="sng" algn="ctr">
+                      <a:solidFill>
+                        <a:srgbClr val="000000"/>
+                      </a:solidFill>
+                      <a:prstDash val="solid"/>
+                      <a:round/>
+                      <a:headEnd type="none" w="med" len="med"/>
+                      <a:tailEnd type="none" w="med" len="med"/>
+                    </a:lnL>
+                    <a:lnR w="12700" cap="flat" cmpd="sng" algn="ctr">
+                      <a:solidFill>
+                        <a:srgbClr val="000000"/>
+                      </a:solidFill>
+                      <a:prstDash val="solid"/>
+                      <a:round/>
+                      <a:headEnd type="none" w="med" len="med"/>
+                      <a:tailEnd type="none" w="med" len="med"/>
+                    </a:lnR>
+                    <a:lnT w="12700" cap="flat" cmpd="sng" algn="ctr">
+                      <a:solidFill>
+                        <a:srgbClr val="000000"/>
+                      </a:solidFill>
+                      <a:prstDash val="solid"/>
+                      <a:round/>
+                      <a:headEnd type="none" w="med" len="med"/>
+                      <a:tailEnd type="none" w="med" len="med"/>
+                    </a:lnT>
+                    <a:lnB w="12700" cap="flat" cmpd="sng" algn="ctr">
+                      <a:solidFill>
+                        <a:srgbClr val="000000"/>
+                      </a:solidFill>
+                      <a:prstDash val="solid"/>
+                      <a:round/>
+                      <a:headEnd type="none" w="med" len="med"/>
+                      <a:tailEnd type="none" w="med" len="med"/>
+                    </a:lnB>
+                  </a:tcPr>
+                </a:tc>
+                <a:extLst>
+                  <a:ext uri="{0D108BD9-81ED-4DB2-BD59-A6C34878D82A}">
+                    <a16:rowId xmlns:a16="http://schemas.microsoft.com/office/drawing/2014/main" val="495791469"/>
+                  </a:ext>
+                </a:extLst>
+              </a:tr>
+              <a:tr h="184212">
+                <a:tc>
+                  <a:txBody>
+                    <a:bodyPr/>
+                    <a:lstStyle/>
+                    <a:p>
+                      <a:pPr algn="ctr" rtl="0" fontAlgn="t">
+                        <a:spcBef>
+                          <a:spcPts val="0"/>
+                        </a:spcBef>
+                        <a:spcAft>
+                          <a:spcPts val="0"/>
+                        </a:spcAft>
+                      </a:pPr>
+                      <a:r>
+                        <a:rPr lang="en-US" sz="1100" b="0" i="0" u="none" strike="noStrike">
+                          <a:solidFill>
+                            <a:srgbClr val="000000"/>
+                          </a:solidFill>
+                          <a:effectLst/>
+                          <a:latin typeface="Arial" panose="020B0604020202020204" pitchFamily="34" charset="0"/>
+                        </a:rPr>
+                        <a:t>PrintStream</a:t>
+                      </a:r>
+                      <a:endParaRPr lang="en-US">
+                        <a:solidFill>
+                          <a:srgbClr val="666666"/>
+                        </a:solidFill>
+                        <a:effectLst/>
+                      </a:endParaRPr>
+                    </a:p>
+                  </a:txBody>
+                  <a:tcPr marL="63500" marR="63500" marT="63500" marB="63500">
+                    <a:lnL w="12700" cap="flat" cmpd="sng" algn="ctr">
+                      <a:solidFill>
+                        <a:srgbClr val="000000"/>
+                      </a:solidFill>
+                      <a:prstDash val="solid"/>
+                      <a:round/>
+                      <a:headEnd type="none" w="med" len="med"/>
+                      <a:tailEnd type="none" w="med" len="med"/>
+                    </a:lnL>
+                    <a:lnR w="12700" cap="flat" cmpd="sng" algn="ctr">
+                      <a:solidFill>
+                        <a:srgbClr val="000000"/>
+                      </a:solidFill>
+                      <a:prstDash val="solid"/>
+                      <a:round/>
+                      <a:headEnd type="none" w="med" len="med"/>
+                      <a:tailEnd type="none" w="med" len="med"/>
+                    </a:lnR>
+                    <a:lnT w="12700" cap="flat" cmpd="sng" algn="ctr">
+                      <a:solidFill>
+                        <a:srgbClr val="000000"/>
+                      </a:solidFill>
+                      <a:prstDash val="solid"/>
+                      <a:round/>
+                      <a:headEnd type="none" w="med" len="med"/>
+                      <a:tailEnd type="none" w="med" len="med"/>
+                    </a:lnT>
+                    <a:lnB w="12700" cap="flat" cmpd="sng" algn="ctr">
+                      <a:solidFill>
+                        <a:srgbClr val="000000"/>
+                      </a:solidFill>
+                      <a:prstDash val="solid"/>
+                      <a:round/>
+                      <a:headEnd type="none" w="med" len="med"/>
+                      <a:tailEnd type="none" w="med" len="med"/>
+                    </a:lnB>
+                  </a:tcPr>
+                </a:tc>
+                <a:tc>
+                  <a:txBody>
+                    <a:bodyPr/>
+                    <a:lstStyle/>
+                    <a:p>
+                      <a:pPr algn="ctr" rtl="0" fontAlgn="t">
+                        <a:spcBef>
+                          <a:spcPts val="0"/>
+                        </a:spcBef>
+                        <a:spcAft>
+                          <a:spcPts val="0"/>
+                        </a:spcAft>
+                      </a:pPr>
+                      <a:r>
+                        <a:rPr lang="en-US" sz="1100" b="0" i="0" u="none" strike="noStrike" dirty="0" err="1">
+                          <a:solidFill>
+                            <a:srgbClr val="000000"/>
+                          </a:solidFill>
+                          <a:effectLst/>
+                          <a:latin typeface="Arial" panose="020B0604020202020204" pitchFamily="34" charset="0"/>
+                        </a:rPr>
+                        <a:t>PrintWriter</a:t>
+                      </a:r>
+                      <a:endParaRPr lang="en-US" dirty="0">
+                        <a:solidFill>
+                          <a:srgbClr val="666666"/>
+                        </a:solidFill>
+                        <a:effectLst/>
+                      </a:endParaRPr>
+                    </a:p>
+                  </a:txBody>
+                  <a:tcPr marL="63500" marR="63500" marT="63500" marB="63500">
+                    <a:lnL w="12700" cap="flat" cmpd="sng" algn="ctr">
+                      <a:solidFill>
+                        <a:srgbClr val="000000"/>
+                      </a:solidFill>
+                      <a:prstDash val="solid"/>
+                      <a:round/>
+                      <a:headEnd type="none" w="med" len="med"/>
+                      <a:tailEnd type="none" w="med" len="med"/>
+                    </a:lnL>
+                    <a:lnR w="12700" cap="flat" cmpd="sng" algn="ctr">
+                      <a:solidFill>
+                        <a:srgbClr val="000000"/>
+                      </a:solidFill>
+                      <a:prstDash val="solid"/>
+                      <a:round/>
+                      <a:headEnd type="none" w="med" len="med"/>
+                      <a:tailEnd type="none" w="med" len="med"/>
+                    </a:lnR>
+                    <a:lnT w="12700" cap="flat" cmpd="sng" algn="ctr">
+                      <a:solidFill>
+                        <a:srgbClr val="000000"/>
+                      </a:solidFill>
+                      <a:prstDash val="solid"/>
+                      <a:round/>
+                      <a:headEnd type="none" w="med" len="med"/>
+                      <a:tailEnd type="none" w="med" len="med"/>
+                    </a:lnT>
+                    <a:lnB w="12700" cap="flat" cmpd="sng" algn="ctr">
+                      <a:solidFill>
+                        <a:srgbClr val="000000"/>
+                      </a:solidFill>
+                      <a:prstDash val="solid"/>
+                      <a:round/>
+                      <a:headEnd type="none" w="med" len="med"/>
+                      <a:tailEnd type="none" w="med" len="med"/>
+                    </a:lnB>
+                  </a:tcPr>
+                </a:tc>
+                <a:tc>
+                  <a:txBody>
+                    <a:bodyPr/>
+                    <a:lstStyle/>
+                    <a:p>
+                      <a:pPr fontAlgn="t"/>
+                      <a:endParaRPr lang="ko-KR" altLang="en-US" sz="1200" dirty="0">
+                        <a:effectLst/>
+                      </a:endParaRPr>
+                    </a:p>
+                  </a:txBody>
+                  <a:tcPr marL="63500" marR="63500" marT="63500" marB="63500">
+                    <a:lnL w="12700" cap="flat" cmpd="sng" algn="ctr">
+                      <a:solidFill>
+                        <a:srgbClr val="000000"/>
+                      </a:solidFill>
+                      <a:prstDash val="solid"/>
+                      <a:round/>
+                      <a:headEnd type="none" w="med" len="med"/>
+                      <a:tailEnd type="none" w="med" len="med"/>
+                    </a:lnL>
+                    <a:lnR w="12700" cap="flat" cmpd="sng" algn="ctr">
+                      <a:solidFill>
+                        <a:srgbClr val="000000"/>
+                      </a:solidFill>
+                      <a:prstDash val="solid"/>
+                      <a:round/>
+                      <a:headEnd type="none" w="med" len="med"/>
+                      <a:tailEnd type="none" w="med" len="med"/>
+                    </a:lnR>
+                    <a:lnT w="12700" cap="flat" cmpd="sng" algn="ctr">
+                      <a:solidFill>
+                        <a:srgbClr val="000000"/>
+                      </a:solidFill>
+                      <a:prstDash val="solid"/>
+                      <a:round/>
+                      <a:headEnd type="none" w="med" len="med"/>
+                      <a:tailEnd type="none" w="med" len="med"/>
+                    </a:lnT>
+                    <a:lnB w="12700" cap="flat" cmpd="sng" algn="ctr">
+                      <a:solidFill>
+                        <a:srgbClr val="000000"/>
+                      </a:solidFill>
+                      <a:prstDash val="solid"/>
+                      <a:round/>
+                      <a:headEnd type="none" w="med" len="med"/>
+                      <a:tailEnd type="none" w="med" len="med"/>
+                    </a:lnB>
+                  </a:tcPr>
+                </a:tc>
+                <a:extLst>
+                  <a:ext uri="{0D108BD9-81ED-4DB2-BD59-A6C34878D82A}">
+                    <a16:rowId xmlns:a16="http://schemas.microsoft.com/office/drawing/2014/main" val="3899556739"/>
+                  </a:ext>
+                </a:extLst>
+              </a:tr>
+              <a:tr h="184212">
+                <a:tc>
+                  <a:txBody>
+                    <a:bodyPr/>
+                    <a:lstStyle/>
+                    <a:p>
+                      <a:pPr algn="ctr" rtl="0" fontAlgn="t">
+                        <a:spcBef>
+                          <a:spcPts val="0"/>
+                        </a:spcBef>
+                        <a:spcAft>
+                          <a:spcPts val="0"/>
+                        </a:spcAft>
+                      </a:pPr>
+                      <a:r>
+                        <a:rPr lang="en-US" sz="1100" b="0" i="0" u="none" strike="noStrike">
+                          <a:solidFill>
+                            <a:srgbClr val="000000"/>
+                          </a:solidFill>
+                          <a:effectLst/>
+                          <a:latin typeface="Arial" panose="020B0604020202020204" pitchFamily="34" charset="0"/>
+                        </a:rPr>
+                        <a:t>Pushback</a:t>
+                      </a:r>
+                      <a:endParaRPr lang="en-US">
+                        <a:solidFill>
+                          <a:srgbClr val="666666"/>
+                        </a:solidFill>
+                        <a:effectLst/>
+                      </a:endParaRPr>
+                    </a:p>
+                  </a:txBody>
+                  <a:tcPr marL="63500" marR="63500" marT="63500" marB="63500">
+                    <a:lnL w="12700" cap="flat" cmpd="sng" algn="ctr">
+                      <a:solidFill>
+                        <a:srgbClr val="000000"/>
+                      </a:solidFill>
+                      <a:prstDash val="solid"/>
+                      <a:round/>
+                      <a:headEnd type="none" w="med" len="med"/>
+                      <a:tailEnd type="none" w="med" len="med"/>
+                    </a:lnL>
+                    <a:lnR w="12700" cap="flat" cmpd="sng" algn="ctr">
+                      <a:solidFill>
+                        <a:srgbClr val="000000"/>
+                      </a:solidFill>
+                      <a:prstDash val="solid"/>
+                      <a:round/>
+                      <a:headEnd type="none" w="med" len="med"/>
+                      <a:tailEnd type="none" w="med" len="med"/>
+                    </a:lnR>
+                    <a:lnT w="12700" cap="flat" cmpd="sng" algn="ctr">
+                      <a:solidFill>
+                        <a:srgbClr val="000000"/>
+                      </a:solidFill>
+                      <a:prstDash val="solid"/>
+                      <a:round/>
+                      <a:headEnd type="none" w="med" len="med"/>
+                      <a:tailEnd type="none" w="med" len="med"/>
+                    </a:lnT>
+                    <a:lnB w="12700" cap="flat" cmpd="sng" algn="ctr">
+                      <a:solidFill>
+                        <a:srgbClr val="000000"/>
+                      </a:solidFill>
+                      <a:prstDash val="solid"/>
+                      <a:round/>
+                      <a:headEnd type="none" w="med" len="med"/>
+                      <a:tailEnd type="none" w="med" len="med"/>
+                    </a:lnB>
+                  </a:tcPr>
+                </a:tc>
+                <a:tc>
+                  <a:txBody>
+                    <a:bodyPr/>
+                    <a:lstStyle/>
+                    <a:p>
+                      <a:pPr algn="ctr" rtl="0" fontAlgn="t">
+                        <a:spcBef>
+                          <a:spcPts val="0"/>
+                        </a:spcBef>
+                        <a:spcAft>
+                          <a:spcPts val="0"/>
+                        </a:spcAft>
+                      </a:pPr>
+                      <a:r>
+                        <a:rPr lang="en-US" sz="1100" b="0" i="0" u="none" strike="noStrike">
+                          <a:solidFill>
+                            <a:srgbClr val="000000"/>
+                          </a:solidFill>
+                          <a:effectLst/>
+                          <a:latin typeface="Arial" panose="020B0604020202020204" pitchFamily="34" charset="0"/>
+                        </a:rPr>
+                        <a:t>Reader</a:t>
+                      </a:r>
+                      <a:endParaRPr lang="en-US">
+                        <a:solidFill>
+                          <a:srgbClr val="666666"/>
+                        </a:solidFill>
+                        <a:effectLst/>
+                      </a:endParaRPr>
+                    </a:p>
+                  </a:txBody>
+                  <a:tcPr marL="63500" marR="63500" marT="63500" marB="63500">
+                    <a:lnL w="12700" cap="flat" cmpd="sng" algn="ctr">
+                      <a:solidFill>
+                        <a:srgbClr val="000000"/>
+                      </a:solidFill>
+                      <a:prstDash val="solid"/>
+                      <a:round/>
+                      <a:headEnd type="none" w="med" len="med"/>
+                      <a:tailEnd type="none" w="med" len="med"/>
+                    </a:lnL>
+                    <a:lnR w="12700" cap="flat" cmpd="sng" algn="ctr">
+                      <a:solidFill>
+                        <a:srgbClr val="000000"/>
+                      </a:solidFill>
+                      <a:prstDash val="solid"/>
+                      <a:round/>
+                      <a:headEnd type="none" w="med" len="med"/>
+                      <a:tailEnd type="none" w="med" len="med"/>
+                    </a:lnR>
+                    <a:lnT w="12700" cap="flat" cmpd="sng" algn="ctr">
+                      <a:solidFill>
+                        <a:srgbClr val="000000"/>
+                      </a:solidFill>
+                      <a:prstDash val="solid"/>
+                      <a:round/>
+                      <a:headEnd type="none" w="med" len="med"/>
+                      <a:tailEnd type="none" w="med" len="med"/>
+                    </a:lnT>
+                    <a:lnB w="12700" cap="flat" cmpd="sng" algn="ctr">
+                      <a:solidFill>
+                        <a:srgbClr val="000000"/>
+                      </a:solidFill>
+                      <a:prstDash val="solid"/>
+                      <a:round/>
+                      <a:headEnd type="none" w="med" len="med"/>
+                      <a:tailEnd type="none" w="med" len="med"/>
+                    </a:lnB>
+                  </a:tcPr>
+                </a:tc>
+                <a:tc>
+                  <a:txBody>
+                    <a:bodyPr/>
+                    <a:lstStyle/>
+                    <a:p>
+                      <a:pPr fontAlgn="t"/>
+                      <a:endParaRPr lang="ko-KR" altLang="en-US" sz="1200" dirty="0">
+                        <a:effectLst/>
+                      </a:endParaRPr>
+                    </a:p>
+                  </a:txBody>
+                  <a:tcPr marL="63500" marR="63500" marT="63500" marB="63500">
+                    <a:lnL w="12700" cap="flat" cmpd="sng" algn="ctr">
+                      <a:solidFill>
+                        <a:srgbClr val="000000"/>
+                      </a:solidFill>
+                      <a:prstDash val="solid"/>
+                      <a:round/>
+                      <a:headEnd type="none" w="med" len="med"/>
+                      <a:tailEnd type="none" w="med" len="med"/>
+                    </a:lnL>
+                    <a:lnR w="12700" cap="flat" cmpd="sng" algn="ctr">
+                      <a:solidFill>
+                        <a:srgbClr val="000000"/>
+                      </a:solidFill>
+                      <a:prstDash val="solid"/>
+                      <a:round/>
+                      <a:headEnd type="none" w="med" len="med"/>
+                      <a:tailEnd type="none" w="med" len="med"/>
+                    </a:lnR>
+                    <a:lnT w="12700" cap="flat" cmpd="sng" algn="ctr">
+                      <a:solidFill>
+                        <a:srgbClr val="000000"/>
+                      </a:solidFill>
+                      <a:prstDash val="solid"/>
+                      <a:round/>
+                      <a:headEnd type="none" w="med" len="med"/>
+                      <a:tailEnd type="none" w="med" len="med"/>
+                    </a:lnT>
+                    <a:lnB w="12700" cap="flat" cmpd="sng" algn="ctr">
+                      <a:solidFill>
+                        <a:srgbClr val="000000"/>
+                      </a:solidFill>
+                      <a:prstDash val="solid"/>
+                      <a:round/>
+                      <a:headEnd type="none" w="med" len="med"/>
+                      <a:tailEnd type="none" w="med" len="med"/>
+                    </a:lnB>
+                  </a:tcPr>
+                </a:tc>
+                <a:extLst>
+                  <a:ext uri="{0D108BD9-81ED-4DB2-BD59-A6C34878D82A}">
+                    <a16:rowId xmlns:a16="http://schemas.microsoft.com/office/drawing/2014/main" val="226475156"/>
+                  </a:ext>
+                </a:extLst>
+              </a:tr>
+            </a:tbl>
+          </a:graphicData>
+        </a:graphic>
+      </p:graphicFrame>
+      <p:sp>
+        <p:nvSpPr>
+          <p:cNvPr id="13" name="Rectangle 2">
+            <a:extLst>
+              <a:ext uri="{FF2B5EF4-FFF2-40B4-BE49-F238E27FC236}">
+                <a16:creationId xmlns:a16="http://schemas.microsoft.com/office/drawing/2014/main" id="{023A9B88-DEEA-4FD1-B679-CB12A090DB79}"/>
+              </a:ext>
+            </a:extLst>
+          </p:cNvPr>
+          <p:cNvSpPr>
+            <a:spLocks noChangeArrowheads="1"/>
+          </p:cNvSpPr>
+          <p:nvPr/>
+        </p:nvSpPr>
+        <p:spPr bwMode="auto">
+          <a:xfrm>
+            <a:off x="5766572" y="4003906"/>
+            <a:ext cx="12192000" cy="0"/>
+          </a:xfrm>
+          <a:prstGeom prst="rect">
+            <a:avLst/>
+          </a:prstGeom>
+          <a:noFill/>
+          <a:ln>
+            <a:noFill/>
+          </a:ln>
+          <a:effectLst/>
+          <a:extLst>
+            <a:ext uri="{909E8E84-426E-40DD-AFC4-6F175D3DCCD1}">
+              <a14:hiddenFill xmlns:a14="http://schemas.microsoft.com/office/drawing/2010/main">
+                <a:solidFill>
+                  <a:schemeClr val="accent1"/>
+                </a:solidFill>
+              </a14:hiddenFill>
+            </a:ext>
+            <a:ext uri="{91240B29-F687-4F45-9708-019B960494DF}">
+              <a14:hiddenLine xmlns:a14="http://schemas.microsoft.com/office/drawing/2010/main" w="9525">
+                <a:solidFill>
+                  <a:schemeClr val="tx1"/>
+                </a:solidFill>
+                <a:miter lim="800000"/>
+                <a:headEnd/>
+                <a:tailEnd/>
+              </a14:hiddenLine>
+            </a:ext>
+            <a:ext uri="{AF507438-7753-43E0-B8FC-AC1667EBCBE1}">
+              <a14:hiddenEffects xmlns:a14="http://schemas.microsoft.com/office/drawing/2010/main">
+                <a:effectLst>
+                  <a:outerShdw dist="35921" dir="2700000" algn="ctr" rotWithShape="0">
+                    <a:schemeClr val="bg2"/>
+                  </a:outerShdw>
+                </a:effectLst>
+              </a14:hiddenEffects>
+            </a:ext>
+          </a:extLst>
+        </p:spPr>
+        <p:txBody>
+          <a:bodyPr vert="horz" wrap="none" lIns="0" tIns="0" rIns="0" bIns="0" numCol="1" anchor="ctr" anchorCtr="0" compatLnSpc="1">
+            <a:prstTxWarp prst="textNoShape">
+              <a:avLst/>
+            </a:prstTxWarp>
+            <a:spAutoFit/>
+          </a:bodyPr>
+          <a:lstStyle/>
+          <a:p>
+            <a:pPr marL="0" marR="0" lvl="0" indent="0" algn="l" defTabSz="914400" rtl="0" eaLnBrk="0" fontAlgn="base" latinLnBrk="0" hangingPunct="0">
+              <a:lnSpc>
+                <a:spcPct val="100000"/>
+              </a:lnSpc>
+              <a:spcBef>
+                <a:spcPct val="0"/>
+              </a:spcBef>
+              <a:spcAft>
+                <a:spcPct val="0"/>
+              </a:spcAft>
+              <a:buClrTx/>
+              <a:buSzTx/>
+              <a:buFontTx/>
+              <a:buNone/>
+              <a:tabLst/>
+            </a:pPr>
+            <a:br>
+              <a:rPr kumimoji="0" lang="ko-KR" altLang="ko-KR" sz="1200" b="0" i="0" u="none" strike="noStrike" cap="none" normalizeH="0" baseline="0">
+                <a:ln>
+                  <a:noFill/>
+                </a:ln>
+                <a:solidFill>
+                  <a:srgbClr val="000000"/>
+                </a:solidFill>
+                <a:effectLst/>
+                <a:latin typeface="Arial" panose="020B0604020202020204" pitchFamily="34" charset="0"/>
+                <a:ea typeface="Noto Sans KR"/>
+              </a:rPr>
+            </a:br>
+            <a:endParaRPr kumimoji="0" lang="ko-KR" altLang="ko-KR" sz="800" b="0" i="0" u="none" strike="noStrike" cap="none" normalizeH="0" baseline="0">
+              <a:ln>
+                <a:noFill/>
+              </a:ln>
+              <a:solidFill>
+                <a:schemeClr val="tx1"/>
+              </a:solidFill>
+              <a:effectLst/>
+              <a:latin typeface="Arial" panose="020B0604020202020204" pitchFamily="34" charset="0"/>
+            </a:endParaRPr>
+          </a:p>
+          <a:p>
+            <a:pPr marL="0" marR="0" lvl="0" indent="0" algn="l" defTabSz="914400" rtl="0" eaLnBrk="0" fontAlgn="base" latinLnBrk="0" hangingPunct="0">
+              <a:lnSpc>
+                <a:spcPct val="100000"/>
+              </a:lnSpc>
+              <a:spcBef>
+                <a:spcPct val="0"/>
+              </a:spcBef>
+              <a:spcAft>
+                <a:spcPct val="0"/>
+              </a:spcAft>
+              <a:buClrTx/>
+              <a:buSzTx/>
+              <a:buFontTx/>
+              <a:buNone/>
+              <a:tabLst/>
+            </a:pPr>
+            <a:br>
+              <a:rPr kumimoji="0" lang="ko-KR" altLang="ko-KR" sz="1800" b="0" i="0" u="none" strike="noStrike" cap="none" normalizeH="0" baseline="0">
+                <a:ln>
+                  <a:noFill/>
+                </a:ln>
+                <a:solidFill>
+                  <a:schemeClr val="tx1"/>
+                </a:solidFill>
+                <a:effectLst/>
+                <a:latin typeface="Arial" panose="020B0604020202020204" pitchFamily="34" charset="0"/>
+              </a:rPr>
+            </a:br>
+            <a:endParaRPr kumimoji="0" lang="ko-KR" altLang="ko-KR" sz="1800" b="0" i="0" u="none" strike="noStrike" cap="none" normalizeH="0" baseline="0">
+              <a:ln>
+                <a:noFill/>
+              </a:ln>
+              <a:solidFill>
+                <a:schemeClr val="tx1"/>
+              </a:solidFill>
+              <a:effectLst/>
+              <a:latin typeface="Arial" panose="020B0604020202020204" pitchFamily="34" charset="0"/>
+            </a:endParaRPr>
+          </a:p>
+        </p:txBody>
+      </p:sp>
+    </p:spTree>
+    <p:extLst>
+      <p:ext uri="{BB962C8B-B14F-4D97-AF65-F5344CB8AC3E}">
+        <p14:creationId xmlns:p14="http://schemas.microsoft.com/office/powerpoint/2010/main" val="2869257988"/>
+      </p:ext>
+    </p:extLst>
+  </p:cSld>
+  <p:clrMapOvr>
+    <a:masterClrMapping/>
+  </p:clrMapOvr>
+</p:sld>
+</file>
+
+<file path=ppt/slides/slide25.xml><?xml version="1.0" encoding="utf-8"?>
+<p:sld xmlns:a="http://schemas.openxmlformats.org/drawingml/2006/main" xmlns:r="http://schemas.openxmlformats.org/officeDocument/2006/relationships" xmlns:p="http://schemas.openxmlformats.org/presentationml/2006/main">
+  <p:cSld>
+    <p:spTree>
+      <p:nvGrpSpPr>
+        <p:cNvPr id="1" name=""/>
+        <p:cNvGrpSpPr/>
+        <p:nvPr/>
+      </p:nvGrpSpPr>
+      <p:grpSpPr>
+        <a:xfrm>
+          <a:off x="0" y="0"/>
+          <a:ext cx="0" cy="0"/>
+          <a:chOff x="0" y="0"/>
+          <a:chExt cx="0" cy="0"/>
+        </a:xfrm>
+      </p:grpSpPr>
+      <p:sp>
+        <p:nvSpPr>
+          <p:cNvPr id="2" name="제목 1">
+            <a:extLst>
+              <a:ext uri="{FF2B5EF4-FFF2-40B4-BE49-F238E27FC236}">
+                <a16:creationId xmlns:a16="http://schemas.microsoft.com/office/drawing/2014/main" id="{4D3D8201-4D9F-4ED2-91BD-18E2C3CA9C8D}"/>
+              </a:ext>
+            </a:extLst>
+          </p:cNvPr>
+          <p:cNvSpPr>
+            <a:spLocks noGrp="1"/>
+          </p:cNvSpPr>
+          <p:nvPr>
+            <p:ph type="title"/>
+          </p:nvPr>
+        </p:nvSpPr>
+        <p:spPr/>
+        <p:txBody>
+          <a:bodyPr/>
+          <a:lstStyle/>
+          <a:p>
+            <a:r>
+              <a:rPr lang="en-US" altLang="ko-KR" dirty="0" err="1"/>
+              <a:t>Theard</a:t>
+            </a:r>
+            <a:endParaRPr lang="ko-KR" altLang="en-US" dirty="0"/>
+          </a:p>
+        </p:txBody>
+      </p:sp>
+      <p:sp>
+        <p:nvSpPr>
+          <p:cNvPr id="3" name="내용 개체 틀 2">
+            <a:extLst>
+              <a:ext uri="{FF2B5EF4-FFF2-40B4-BE49-F238E27FC236}">
+                <a16:creationId xmlns:a16="http://schemas.microsoft.com/office/drawing/2014/main" id="{11F40835-8B0F-485A-A591-5759AD6B84BC}"/>
+              </a:ext>
+            </a:extLst>
+          </p:cNvPr>
+          <p:cNvSpPr>
+            <a:spLocks noGrp="1"/>
+          </p:cNvSpPr>
+          <p:nvPr>
+            <p:ph idx="1"/>
+          </p:nvPr>
+        </p:nvSpPr>
+        <p:spPr/>
+        <p:txBody>
+          <a:bodyPr/>
+          <a:lstStyle/>
+          <a:p>
+            <a:r>
+              <a:rPr lang="ko-KR" altLang="en-US" dirty="0"/>
+              <a:t>쓰레드는 </a:t>
+            </a:r>
+            <a:r>
+              <a:rPr lang="en-US" altLang="ko-KR" dirty="0"/>
+              <a:t>Thread </a:t>
+            </a:r>
+            <a:r>
+              <a:rPr lang="ko-KR" altLang="en-US" dirty="0"/>
+              <a:t>클래스 또는 </a:t>
+            </a:r>
+            <a:r>
+              <a:rPr lang="en-US" altLang="ko-KR" dirty="0"/>
+              <a:t>runnable </a:t>
+            </a:r>
+            <a:r>
+              <a:rPr lang="ko-KR" altLang="en-US" dirty="0"/>
+              <a:t>인터페이스를 상속해 생성</a:t>
+            </a:r>
+            <a:endParaRPr lang="en-US" altLang="ko-KR" dirty="0"/>
+          </a:p>
+          <a:p>
+            <a:r>
+              <a:rPr lang="ko-KR" altLang="en-US" dirty="0"/>
+              <a:t>여러 개의 </a:t>
+            </a:r>
+            <a:r>
+              <a:rPr lang="en-US" altLang="ko-KR" dirty="0"/>
+              <a:t>Thread</a:t>
+            </a:r>
+            <a:r>
+              <a:rPr lang="ko-KR" altLang="en-US" dirty="0"/>
+              <a:t>가 한 객체를 공유하는 것을 공유 객체라고 함</a:t>
+            </a:r>
+            <a:r>
+              <a:rPr lang="en-US" altLang="ko-KR" dirty="0"/>
+              <a:t>.</a:t>
+            </a:r>
+          </a:p>
+          <a:p>
+            <a:r>
+              <a:rPr lang="ko-KR" altLang="en-US" dirty="0"/>
+              <a:t>쓰레드를 시작하기 전에 </a:t>
+            </a:r>
+            <a:r>
+              <a:rPr lang="en-US" altLang="ko-KR" dirty="0"/>
+              <a:t>start </a:t>
+            </a:r>
+            <a:r>
+              <a:rPr lang="ko-KR" altLang="en-US" dirty="0"/>
+              <a:t>메소드를 </a:t>
+            </a:r>
+            <a:r>
+              <a:rPr lang="ko-KR" altLang="en-US" dirty="0" err="1"/>
+              <a:t>호출해야함</a:t>
+            </a:r>
+            <a:r>
+              <a:rPr lang="en-US" altLang="ko-KR" dirty="0"/>
+              <a:t>.</a:t>
+            </a:r>
+          </a:p>
+          <a:p>
+            <a:r>
+              <a:rPr lang="en-US" altLang="ko-KR" dirty="0"/>
+              <a:t>Runnable </a:t>
+            </a:r>
+            <a:r>
+              <a:rPr lang="ko-KR" altLang="en-US" dirty="0"/>
+              <a:t>인터페이스 상속해 </a:t>
+            </a:r>
+            <a:r>
+              <a:rPr lang="en-US" altLang="ko-KR" dirty="0"/>
+              <a:t>Thread </a:t>
+            </a:r>
+            <a:r>
+              <a:rPr lang="ko-KR" altLang="en-US" dirty="0"/>
+              <a:t>돌릴 시 </a:t>
+            </a:r>
+            <a:r>
+              <a:rPr lang="en-US" altLang="ko-KR" dirty="0"/>
+              <a:t>Thread </a:t>
+            </a:r>
+            <a:r>
+              <a:rPr lang="ko-KR" altLang="en-US" dirty="0"/>
+              <a:t>객체를 생성해서 </a:t>
+            </a:r>
+            <a:r>
+              <a:rPr lang="en-US" altLang="ko-KR" dirty="0"/>
+              <a:t>Thread</a:t>
+            </a:r>
+            <a:r>
+              <a:rPr lang="ko-KR" altLang="en-US" dirty="0"/>
+              <a:t>를</a:t>
+            </a:r>
+            <a:r>
+              <a:rPr lang="en-US" altLang="ko-KR" dirty="0"/>
+              <a:t> </a:t>
+            </a:r>
+            <a:r>
+              <a:rPr lang="ko-KR" altLang="en-US" dirty="0" err="1"/>
+              <a:t>돌려야함</a:t>
+            </a:r>
+            <a:r>
+              <a:rPr lang="en-US" altLang="ko-KR" dirty="0"/>
+              <a:t>.</a:t>
+            </a:r>
+            <a:endParaRPr lang="ko-KR" altLang="en-US" dirty="0"/>
+          </a:p>
+        </p:txBody>
+      </p:sp>
+    </p:spTree>
+    <p:extLst>
+      <p:ext uri="{BB962C8B-B14F-4D97-AF65-F5344CB8AC3E}">
+        <p14:creationId xmlns:p14="http://schemas.microsoft.com/office/powerpoint/2010/main" val="1260420599"/>
       </p:ext>
     </p:extLst>
   </p:cSld>

</xml_diff>

<commit_message>
[일기, 학습정리]  - 2020/12/19
</commit_message>
<xml_diff>
--- a/학습자료/학습 정리.pptx
+++ b/학습자료/학습 정리.pptx
@@ -30,6 +30,9 @@
     <p:sldId id="278" r:id="rId24"/>
     <p:sldId id="279" r:id="rId25"/>
     <p:sldId id="280" r:id="rId26"/>
+    <p:sldId id="281" r:id="rId27"/>
+    <p:sldId id="282" r:id="rId28"/>
+    <p:sldId id="283" r:id="rId29"/>
   </p:sldIdLst>
   <p:sldSz cx="12192000" cy="6858000"/>
   <p:notesSz cx="6858000" cy="9144000"/>
@@ -283,7 +286,7 @@
           <a:p>
             <a:fld id="{0C572C61-C509-4714-B304-DEF8ECAB5EC0}" type="datetimeFigureOut">
               <a:rPr lang="ko-KR" altLang="en-US" smtClean="0"/>
-              <a:t>2020-12-18</a:t>
+              <a:t>2020-12-19</a:t>
             </a:fld>
             <a:endParaRPr lang="ko-KR" altLang="en-US"/>
           </a:p>
@@ -481,7 +484,7 @@
           <a:p>
             <a:fld id="{0C572C61-C509-4714-B304-DEF8ECAB5EC0}" type="datetimeFigureOut">
               <a:rPr lang="ko-KR" altLang="en-US" smtClean="0"/>
-              <a:t>2020-12-18</a:t>
+              <a:t>2020-12-19</a:t>
             </a:fld>
             <a:endParaRPr lang="ko-KR" altLang="en-US"/>
           </a:p>
@@ -689,7 +692,7 @@
           <a:p>
             <a:fld id="{0C572C61-C509-4714-B304-DEF8ECAB5EC0}" type="datetimeFigureOut">
               <a:rPr lang="ko-KR" altLang="en-US" smtClean="0"/>
-              <a:t>2020-12-18</a:t>
+              <a:t>2020-12-19</a:t>
             </a:fld>
             <a:endParaRPr lang="ko-KR" altLang="en-US"/>
           </a:p>
@@ -887,7 +890,7 @@
           <a:p>
             <a:fld id="{0C572C61-C509-4714-B304-DEF8ECAB5EC0}" type="datetimeFigureOut">
               <a:rPr lang="ko-KR" altLang="en-US" smtClean="0"/>
-              <a:t>2020-12-18</a:t>
+              <a:t>2020-12-19</a:t>
             </a:fld>
             <a:endParaRPr lang="ko-KR" altLang="en-US"/>
           </a:p>
@@ -1162,7 +1165,7 @@
           <a:p>
             <a:fld id="{0C572C61-C509-4714-B304-DEF8ECAB5EC0}" type="datetimeFigureOut">
               <a:rPr lang="ko-KR" altLang="en-US" smtClean="0"/>
-              <a:t>2020-12-18</a:t>
+              <a:t>2020-12-19</a:t>
             </a:fld>
             <a:endParaRPr lang="ko-KR" altLang="en-US"/>
           </a:p>
@@ -1427,7 +1430,7 @@
           <a:p>
             <a:fld id="{0C572C61-C509-4714-B304-DEF8ECAB5EC0}" type="datetimeFigureOut">
               <a:rPr lang="ko-KR" altLang="en-US" smtClean="0"/>
-              <a:t>2020-12-18</a:t>
+              <a:t>2020-12-19</a:t>
             </a:fld>
             <a:endParaRPr lang="ko-KR" altLang="en-US"/>
           </a:p>
@@ -1839,7 +1842,7 @@
           <a:p>
             <a:fld id="{0C572C61-C509-4714-B304-DEF8ECAB5EC0}" type="datetimeFigureOut">
               <a:rPr lang="ko-KR" altLang="en-US" smtClean="0"/>
-              <a:t>2020-12-18</a:t>
+              <a:t>2020-12-19</a:t>
             </a:fld>
             <a:endParaRPr lang="ko-KR" altLang="en-US"/>
           </a:p>
@@ -1980,7 +1983,7 @@
           <a:p>
             <a:fld id="{0C572C61-C509-4714-B304-DEF8ECAB5EC0}" type="datetimeFigureOut">
               <a:rPr lang="ko-KR" altLang="en-US" smtClean="0"/>
-              <a:t>2020-12-18</a:t>
+              <a:t>2020-12-19</a:t>
             </a:fld>
             <a:endParaRPr lang="ko-KR" altLang="en-US"/>
           </a:p>
@@ -2093,7 +2096,7 @@
           <a:p>
             <a:fld id="{0C572C61-C509-4714-B304-DEF8ECAB5EC0}" type="datetimeFigureOut">
               <a:rPr lang="ko-KR" altLang="en-US" smtClean="0"/>
-              <a:t>2020-12-18</a:t>
+              <a:t>2020-12-19</a:t>
             </a:fld>
             <a:endParaRPr lang="ko-KR" altLang="en-US"/>
           </a:p>
@@ -2404,7 +2407,7 @@
           <a:p>
             <a:fld id="{0C572C61-C509-4714-B304-DEF8ECAB5EC0}" type="datetimeFigureOut">
               <a:rPr lang="ko-KR" altLang="en-US" smtClean="0"/>
-              <a:t>2020-12-18</a:t>
+              <a:t>2020-12-19</a:t>
             </a:fld>
             <a:endParaRPr lang="ko-KR" altLang="en-US"/>
           </a:p>
@@ -2692,7 +2695,7 @@
           <a:p>
             <a:fld id="{0C572C61-C509-4714-B304-DEF8ECAB5EC0}" type="datetimeFigureOut">
               <a:rPr lang="ko-KR" altLang="en-US" smtClean="0"/>
-              <a:t>2020-12-18</a:t>
+              <a:t>2020-12-19</a:t>
             </a:fld>
             <a:endParaRPr lang="ko-KR" altLang="en-US"/>
           </a:p>
@@ -2933,7 +2936,7 @@
           <a:p>
             <a:fld id="{0C572C61-C509-4714-B304-DEF8ECAB5EC0}" type="datetimeFigureOut">
               <a:rPr lang="ko-KR" altLang="en-US" smtClean="0"/>
-              <a:t>2020-12-18</a:t>
+              <a:t>2020-12-19</a:t>
             </a:fld>
             <a:endParaRPr lang="ko-KR" altLang="en-US"/>
           </a:p>
@@ -17584,6 +17587,495 @@
 </p:sld>
 </file>
 
+<file path=ppt/slides/slide26.xml><?xml version="1.0" encoding="utf-8"?>
+<p:sld xmlns:a="http://schemas.openxmlformats.org/drawingml/2006/main" xmlns:r="http://schemas.openxmlformats.org/officeDocument/2006/relationships" xmlns:p="http://schemas.openxmlformats.org/presentationml/2006/main">
+  <p:cSld>
+    <p:spTree>
+      <p:nvGrpSpPr>
+        <p:cNvPr id="1" name=""/>
+        <p:cNvGrpSpPr/>
+        <p:nvPr/>
+      </p:nvGrpSpPr>
+      <p:grpSpPr>
+        <a:xfrm>
+          <a:off x="0" y="0"/>
+          <a:ext cx="0" cy="0"/>
+          <a:chOff x="0" y="0"/>
+          <a:chExt cx="0" cy="0"/>
+        </a:xfrm>
+      </p:grpSpPr>
+      <p:sp>
+        <p:nvSpPr>
+          <p:cNvPr id="2" name="제목 1">
+            <a:extLst>
+              <a:ext uri="{FF2B5EF4-FFF2-40B4-BE49-F238E27FC236}">
+                <a16:creationId xmlns:a16="http://schemas.microsoft.com/office/drawing/2014/main" id="{E868E1AC-D831-4FFB-AC85-372FCBCBB55A}"/>
+              </a:ext>
+            </a:extLst>
+          </p:cNvPr>
+          <p:cNvSpPr>
+            <a:spLocks noGrp="1"/>
+          </p:cNvSpPr>
+          <p:nvPr>
+            <p:ph type="title"/>
+          </p:nvPr>
+        </p:nvSpPr>
+        <p:spPr/>
+        <p:txBody>
+          <a:bodyPr/>
+          <a:lstStyle/>
+          <a:p>
+            <a:r>
+              <a:rPr lang="en-US" altLang="ko-KR" dirty="0" err="1"/>
+              <a:t>RxAndroid</a:t>
+            </a:r>
+            <a:r>
+              <a:rPr lang="en-US" altLang="ko-KR" dirty="0"/>
+              <a:t>, </a:t>
+            </a:r>
+            <a:r>
+              <a:rPr lang="en-US" altLang="ko-KR" dirty="0" err="1"/>
+              <a:t>reactivex</a:t>
+            </a:r>
+            <a:r>
+              <a:rPr lang="ko-KR" altLang="en-US" dirty="0"/>
+              <a:t>란</a:t>
+            </a:r>
+            <a:r>
+              <a:rPr lang="en-US" altLang="ko-KR" dirty="0"/>
+              <a:t>?</a:t>
+            </a:r>
+            <a:endParaRPr lang="ko-KR" altLang="en-US" dirty="0"/>
+          </a:p>
+        </p:txBody>
+      </p:sp>
+      <p:sp>
+        <p:nvSpPr>
+          <p:cNvPr id="3" name="내용 개체 틀 2">
+            <a:extLst>
+              <a:ext uri="{FF2B5EF4-FFF2-40B4-BE49-F238E27FC236}">
+                <a16:creationId xmlns:a16="http://schemas.microsoft.com/office/drawing/2014/main" id="{24CAE832-CCA8-40C8-924C-AA0964EC28D1}"/>
+              </a:ext>
+            </a:extLst>
+          </p:cNvPr>
+          <p:cNvSpPr>
+            <a:spLocks noGrp="1"/>
+          </p:cNvSpPr>
+          <p:nvPr>
+            <p:ph idx="1"/>
+          </p:nvPr>
+        </p:nvSpPr>
+        <p:spPr/>
+        <p:txBody>
+          <a:bodyPr>
+            <a:normAutofit fontScale="77500" lnSpcReduction="20000"/>
+          </a:bodyPr>
+          <a:lstStyle/>
+          <a:p>
+            <a:r>
+              <a:rPr lang="en-US" altLang="ko-KR" dirty="0" err="1"/>
+              <a:t>RxAndroid</a:t>
+            </a:r>
+            <a:r>
+              <a:rPr lang="ko-KR" altLang="en-US" dirty="0"/>
+              <a:t>는 </a:t>
+            </a:r>
+            <a:r>
+              <a:rPr lang="en-US" altLang="ko-KR" dirty="0" err="1"/>
+              <a:t>ReactiveX</a:t>
+            </a:r>
+            <a:r>
+              <a:rPr lang="en-US" altLang="ko-KR" dirty="0"/>
+              <a:t> </a:t>
+            </a:r>
+            <a:r>
+              <a:rPr lang="ko-KR" altLang="en-US" dirty="0"/>
+              <a:t>관련기능을 쉽고 간결하게 사용할 수 있는 라이브러리</a:t>
+            </a:r>
+            <a:endParaRPr lang="en-US" altLang="ko-KR" dirty="0"/>
+          </a:p>
+          <a:p>
+            <a:endParaRPr lang="en-US" altLang="ko-KR" dirty="0"/>
+          </a:p>
+          <a:p>
+            <a:r>
+              <a:rPr lang="ko-KR" altLang="en-US" dirty="0"/>
+              <a:t>스레드 사용에 있어 편하게 해준다</a:t>
+            </a:r>
+            <a:r>
+              <a:rPr lang="en-US" altLang="ko-KR" dirty="0"/>
+              <a:t>.</a:t>
+            </a:r>
+          </a:p>
+          <a:p>
+            <a:r>
+              <a:rPr lang="ko-KR" altLang="en-US" dirty="0"/>
+              <a:t>비동기 구조에서 에러 다루기 쉽다</a:t>
+            </a:r>
+            <a:r>
+              <a:rPr lang="en-US" altLang="ko-KR" dirty="0"/>
+              <a:t>.</a:t>
+            </a:r>
+          </a:p>
+          <a:p>
+            <a:endParaRPr lang="en-US" altLang="ko-KR" dirty="0"/>
+          </a:p>
+          <a:p>
+            <a:r>
+              <a:rPr lang="ko-KR" altLang="en-US" dirty="0"/>
+              <a:t>기존의 비동기 방식</a:t>
+            </a:r>
+            <a:endParaRPr lang="en-US" altLang="ko-KR" dirty="0"/>
+          </a:p>
+          <a:p>
+            <a:r>
+              <a:rPr lang="ko-KR" altLang="en-US" dirty="0"/>
+              <a:t>비동기 작업 </a:t>
+            </a:r>
+            <a:r>
+              <a:rPr lang="en-US" altLang="ko-KR" dirty="0"/>
+              <a:t>A</a:t>
+            </a:r>
+            <a:r>
+              <a:rPr lang="ko-KR" altLang="en-US" dirty="0"/>
+              <a:t>를</a:t>
+            </a:r>
+            <a:r>
+              <a:rPr lang="en-US" altLang="ko-KR" dirty="0"/>
+              <a:t> </a:t>
+            </a:r>
+            <a:r>
+              <a:rPr lang="ko-KR" altLang="en-US" dirty="0"/>
+              <a:t>하면 </a:t>
+            </a:r>
+            <a:r>
+              <a:rPr lang="en-US" altLang="ko-KR" dirty="0"/>
+              <a:t>B</a:t>
+            </a:r>
+            <a:r>
+              <a:rPr lang="ko-KR" altLang="en-US" dirty="0"/>
+              <a:t>를 한다</a:t>
+            </a:r>
+            <a:r>
+              <a:rPr lang="en-US" altLang="ko-KR" dirty="0"/>
+              <a:t>.</a:t>
+            </a:r>
+          </a:p>
+          <a:p>
+            <a:endParaRPr lang="en-US" altLang="ko-KR" dirty="0"/>
+          </a:p>
+          <a:p>
+            <a:r>
+              <a:rPr lang="en-US" altLang="ko-KR" dirty="0" err="1"/>
+              <a:t>ReactiveX</a:t>
+            </a:r>
+            <a:r>
+              <a:rPr lang="ko-KR" altLang="en-US" dirty="0"/>
+              <a:t>의 비동기 방식</a:t>
+            </a:r>
+            <a:r>
+              <a:rPr lang="en-US" altLang="ko-KR" dirty="0"/>
+              <a:t>?</a:t>
+            </a:r>
+          </a:p>
+          <a:p>
+            <a:r>
+              <a:rPr lang="ko-KR" altLang="en-US" dirty="0"/>
+              <a:t>비동기 작업 </a:t>
+            </a:r>
+            <a:r>
+              <a:rPr lang="en-US" altLang="ko-KR" dirty="0"/>
+              <a:t>A</a:t>
+            </a:r>
+            <a:r>
+              <a:rPr lang="ko-KR" altLang="en-US" dirty="0"/>
+              <a:t>가</a:t>
+            </a:r>
+            <a:r>
+              <a:rPr lang="en-US" altLang="ko-KR" dirty="0"/>
+              <a:t> </a:t>
+            </a:r>
+            <a:r>
+              <a:rPr lang="ko-KR" altLang="en-US" dirty="0"/>
+              <a:t>이벤트를</a:t>
+            </a:r>
+            <a:r>
+              <a:rPr lang="en-US" altLang="ko-KR" dirty="0"/>
+              <a:t> </a:t>
+            </a:r>
+            <a:r>
+              <a:rPr lang="ko-KR" altLang="en-US" dirty="0"/>
+              <a:t>발행하면 </a:t>
+            </a:r>
+            <a:r>
+              <a:rPr lang="en-US" altLang="ko-KR" dirty="0"/>
+              <a:t>B</a:t>
+            </a:r>
+            <a:r>
+              <a:rPr lang="ko-KR" altLang="en-US" dirty="0"/>
+              <a:t>가</a:t>
+            </a:r>
+            <a:r>
+              <a:rPr lang="en-US" altLang="ko-KR" dirty="0"/>
+              <a:t> </a:t>
+            </a:r>
+            <a:r>
+              <a:rPr lang="ko-KR" altLang="en-US" dirty="0"/>
+              <a:t>구독을 수행한다</a:t>
+            </a:r>
+            <a:r>
+              <a:rPr lang="en-US" altLang="ko-KR" dirty="0"/>
+              <a:t>.</a:t>
+            </a:r>
+          </a:p>
+          <a:p>
+            <a:r>
+              <a:rPr lang="en-US" altLang="ko-KR" dirty="0"/>
+              <a:t>B</a:t>
+            </a:r>
+            <a:r>
+              <a:rPr lang="ko-KR" altLang="en-US" dirty="0"/>
+              <a:t>는 </a:t>
+            </a:r>
+            <a:r>
+              <a:rPr lang="en-US" altLang="ko-KR" dirty="0"/>
+              <a:t>Observer</a:t>
+            </a:r>
+          </a:p>
+          <a:p>
+            <a:endParaRPr lang="en-US" altLang="ko-KR" dirty="0"/>
+          </a:p>
+        </p:txBody>
+      </p:sp>
+    </p:spTree>
+    <p:extLst>
+      <p:ext uri="{BB962C8B-B14F-4D97-AF65-F5344CB8AC3E}">
+        <p14:creationId xmlns:p14="http://schemas.microsoft.com/office/powerpoint/2010/main" val="2667730032"/>
+      </p:ext>
+    </p:extLst>
+  </p:cSld>
+  <p:clrMapOvr>
+    <a:masterClrMapping/>
+  </p:clrMapOvr>
+</p:sld>
+</file>
+
+<file path=ppt/slides/slide27.xml><?xml version="1.0" encoding="utf-8"?>
+<p:sld xmlns:a="http://schemas.openxmlformats.org/drawingml/2006/main" xmlns:r="http://schemas.openxmlformats.org/officeDocument/2006/relationships" xmlns:p="http://schemas.openxmlformats.org/presentationml/2006/main">
+  <p:cSld>
+    <p:spTree>
+      <p:nvGrpSpPr>
+        <p:cNvPr id="1" name=""/>
+        <p:cNvGrpSpPr/>
+        <p:nvPr/>
+      </p:nvGrpSpPr>
+      <p:grpSpPr>
+        <a:xfrm>
+          <a:off x="0" y="0"/>
+          <a:ext cx="0" cy="0"/>
+          <a:chOff x="0" y="0"/>
+          <a:chExt cx="0" cy="0"/>
+        </a:xfrm>
+      </p:grpSpPr>
+      <p:sp>
+        <p:nvSpPr>
+          <p:cNvPr id="2" name="제목 1">
+            <a:extLst>
+              <a:ext uri="{FF2B5EF4-FFF2-40B4-BE49-F238E27FC236}">
+                <a16:creationId xmlns:a16="http://schemas.microsoft.com/office/drawing/2014/main" id="{FC70AAAF-E719-4930-BB0F-25E37847360A}"/>
+              </a:ext>
+            </a:extLst>
+          </p:cNvPr>
+          <p:cNvSpPr>
+            <a:spLocks noGrp="1"/>
+          </p:cNvSpPr>
+          <p:nvPr>
+            <p:ph type="title"/>
+          </p:nvPr>
+        </p:nvSpPr>
+        <p:spPr/>
+        <p:txBody>
+          <a:bodyPr/>
+          <a:lstStyle/>
+          <a:p>
+            <a:r>
+              <a:rPr lang="en-US" altLang="ko-KR" dirty="0"/>
+              <a:t>Rx</a:t>
+            </a:r>
+            <a:r>
+              <a:rPr lang="ko-KR" altLang="en-US" dirty="0"/>
+              <a:t>란</a:t>
+            </a:r>
+            <a:r>
+              <a:rPr lang="en-US" altLang="ko-KR" dirty="0"/>
+              <a:t>?</a:t>
+            </a:r>
+            <a:endParaRPr lang="ko-KR" altLang="en-US" dirty="0"/>
+          </a:p>
+        </p:txBody>
+      </p:sp>
+      <p:sp>
+        <p:nvSpPr>
+          <p:cNvPr id="3" name="내용 개체 틀 2">
+            <a:extLst>
+              <a:ext uri="{FF2B5EF4-FFF2-40B4-BE49-F238E27FC236}">
+                <a16:creationId xmlns:a16="http://schemas.microsoft.com/office/drawing/2014/main" id="{C5899BEF-193E-4B17-ACE3-2018A07508B8}"/>
+              </a:ext>
+            </a:extLst>
+          </p:cNvPr>
+          <p:cNvSpPr>
+            <a:spLocks noGrp="1"/>
+          </p:cNvSpPr>
+          <p:nvPr>
+            <p:ph idx="1"/>
+          </p:nvPr>
+        </p:nvSpPr>
+        <p:spPr/>
+        <p:txBody>
+          <a:bodyPr/>
+          <a:lstStyle/>
+          <a:p>
+            <a:r>
+              <a:rPr lang="en-US" altLang="ko-KR" dirty="0"/>
+              <a:t>Observable</a:t>
+            </a:r>
+          </a:p>
+          <a:p>
+            <a:r>
+              <a:rPr lang="ko-KR" altLang="en-US" dirty="0"/>
+              <a:t>이벤트</a:t>
+            </a:r>
+            <a:r>
+              <a:rPr lang="en-US" altLang="ko-KR" dirty="0"/>
+              <a:t> </a:t>
+            </a:r>
+            <a:r>
+              <a:rPr lang="ko-KR" altLang="en-US" dirty="0"/>
+              <a:t>발행 주체</a:t>
+            </a:r>
+            <a:endParaRPr lang="en-US" altLang="ko-KR" dirty="0"/>
+          </a:p>
+          <a:p>
+            <a:r>
+              <a:rPr lang="en-US" altLang="ko-KR" dirty="0"/>
+              <a:t>Observer</a:t>
+            </a:r>
+            <a:r>
+              <a:rPr lang="ko-KR" altLang="en-US" dirty="0"/>
+              <a:t>를 </a:t>
+            </a:r>
+            <a:r>
+              <a:rPr lang="ko-KR" altLang="en-US" dirty="0" err="1"/>
+              <a:t>구독시키면</a:t>
+            </a:r>
+            <a:r>
+              <a:rPr lang="ko-KR" altLang="en-US" dirty="0"/>
+              <a:t> </a:t>
+            </a:r>
+            <a:r>
+              <a:rPr lang="en-US" altLang="ko-KR" dirty="0"/>
+              <a:t>(subscribe())</a:t>
+            </a:r>
+          </a:p>
+          <a:p>
+            <a:r>
+              <a:rPr lang="ko-KR" altLang="en-US" dirty="0"/>
+              <a:t>이벤트 발생 시 구독 중인 </a:t>
+            </a:r>
+            <a:r>
+              <a:rPr lang="en-US" altLang="ko-KR" dirty="0"/>
+              <a:t>Observer</a:t>
+            </a:r>
+            <a:r>
+              <a:rPr lang="ko-KR" altLang="en-US" dirty="0"/>
+              <a:t>의</a:t>
+            </a:r>
+            <a:r>
+              <a:rPr lang="en-US" altLang="ko-KR" dirty="0"/>
+              <a:t> </a:t>
+            </a:r>
+            <a:r>
+              <a:rPr lang="en-US" altLang="ko-KR" dirty="0" err="1"/>
+              <a:t>onNext</a:t>
+            </a:r>
+            <a:r>
+              <a:rPr lang="ko-KR" altLang="en-US" dirty="0"/>
+              <a:t>를 수행</a:t>
+            </a:r>
+            <a:endParaRPr lang="en-US" altLang="ko-KR" dirty="0"/>
+          </a:p>
+          <a:p>
+            <a:r>
+              <a:rPr lang="en-US" altLang="ko-KR" dirty="0"/>
+              <a:t>Rx</a:t>
+            </a:r>
+            <a:r>
+              <a:rPr lang="ko-KR" altLang="en-US" dirty="0"/>
+              <a:t>를 이용해 최근에 </a:t>
+            </a:r>
+            <a:r>
+              <a:rPr lang="ko-KR" altLang="en-US" dirty="0" err="1"/>
+              <a:t>디프리케이티드</a:t>
+            </a:r>
+            <a:r>
+              <a:rPr lang="ko-KR" altLang="en-US" dirty="0"/>
+              <a:t> 된 </a:t>
+            </a:r>
+            <a:r>
+              <a:rPr lang="en-US" altLang="ko-KR" dirty="0" err="1"/>
+              <a:t>asynctask</a:t>
+            </a:r>
+            <a:r>
+              <a:rPr lang="ko-KR" altLang="en-US" dirty="0"/>
+              <a:t>를 대체 할 수 있음</a:t>
+            </a:r>
+            <a:endParaRPr lang="en-US" altLang="ko-KR" dirty="0"/>
+          </a:p>
+        </p:txBody>
+      </p:sp>
+    </p:spTree>
+    <p:extLst>
+      <p:ext uri="{BB962C8B-B14F-4D97-AF65-F5344CB8AC3E}">
+        <p14:creationId xmlns:p14="http://schemas.microsoft.com/office/powerpoint/2010/main" val="575089901"/>
+      </p:ext>
+    </p:extLst>
+  </p:cSld>
+  <p:clrMapOvr>
+    <a:masterClrMapping/>
+  </p:clrMapOvr>
+</p:sld>
+</file>
+
+<file path=ppt/slides/slide28.xml><?xml version="1.0" encoding="utf-8"?>
+<p:sld xmlns:a="http://schemas.openxmlformats.org/drawingml/2006/main" xmlns:r="http://schemas.openxmlformats.org/officeDocument/2006/relationships" xmlns:p="http://schemas.openxmlformats.org/presentationml/2006/main">
+  <p:cSld>
+    <p:spTree>
+      <p:nvGrpSpPr>
+        <p:cNvPr id="1" name=""/>
+        <p:cNvGrpSpPr/>
+        <p:nvPr/>
+      </p:nvGrpSpPr>
+      <p:grpSpPr>
+        <a:xfrm>
+          <a:off x="0" y="0"/>
+          <a:ext cx="0" cy="0"/>
+          <a:chOff x="0" y="0"/>
+          <a:chExt cx="0" cy="0"/>
+        </a:xfrm>
+      </p:grpSpPr>
+    </p:spTree>
+    <p:extLst>
+      <p:ext uri="{BB962C8B-B14F-4D97-AF65-F5344CB8AC3E}">
+        <p14:creationId xmlns:p14="http://schemas.microsoft.com/office/powerpoint/2010/main" val="1466667355"/>
+      </p:ext>
+    </p:extLst>
+  </p:cSld>
+  <p:clrMapOvr>
+    <a:masterClrMapping/>
+  </p:clrMapOvr>
+</p:sld>
+</file>
+
 <file path=ppt/slides/slide3.xml><?xml version="1.0" encoding="utf-8"?>
 <p:sld xmlns:a="http://schemas.openxmlformats.org/drawingml/2006/main" xmlns:r="http://schemas.openxmlformats.org/officeDocument/2006/relationships" xmlns:p="http://schemas.openxmlformats.org/presentationml/2006/main">
   <p:cSld>

</xml_diff>